<commit_message>
Signed-off-by: Mr. Snow <Mr. Snow>
</commit_message>
<xml_diff>
--- a/教程/Index.pptx
+++ b/教程/Index.pptx
@@ -6681,96 +6681,96 @@
     </dgm:pt>
   </dgm:ptLst>
   <dgm:cxnLst>
+    <dgm:cxn modelId="{AF361DD8-F289-4CF0-A832-21B3C4C099A3}" type="presOf" srcId="{54B22CF6-907D-4AD8-92C4-0399267F5D7A}" destId="{57E8A9A6-D72E-44F7-98C8-FCFACFF93606}" srcOrd="0" destOrd="0" presId="urn:microsoft.com/office/officeart/2008/layout/NameandTitleOrganizationalChart"/>
+    <dgm:cxn modelId="{47ADFDB1-FB21-4EDE-827A-31572B4DB065}" type="presOf" srcId="{1BA13A82-364A-46CA-BDAF-792FE3D2913E}" destId="{0133BCC6-49F8-4231-BAB2-704AE1F1BE24}" srcOrd="0" destOrd="0" presId="urn:microsoft.com/office/officeart/2008/layout/NameandTitleOrganizationalChart"/>
+    <dgm:cxn modelId="{3ED77A3D-3F99-43A8-91ED-07EAC87BD0E8}" type="presOf" srcId="{B91C093C-03B1-401C-8462-11DC6CC3E891}" destId="{1C89C8D1-8B8E-4239-BCFF-04AA4DF5D267}" srcOrd="0" destOrd="0" presId="urn:microsoft.com/office/officeart/2008/layout/NameandTitleOrganizationalChart"/>
+    <dgm:cxn modelId="{A6F377CB-C53E-4C6C-97CB-EEE17BB8EA2E}" type="presOf" srcId="{AB091C5F-1C2B-4511-A681-D7B94BC00380}" destId="{50939023-49D7-4F51-AD1D-21231C706D1C}" srcOrd="0" destOrd="0" presId="urn:microsoft.com/office/officeart/2008/layout/NameandTitleOrganizationalChart"/>
+    <dgm:cxn modelId="{90457F4E-5C90-405E-8D3B-3608B68FDC52}" type="presOf" srcId="{2DB39D95-EFF2-420B-AFBF-73D10E1400C0}" destId="{95E6DB3B-AD48-4715-9855-4898B682D86D}" srcOrd="0" destOrd="0" presId="urn:microsoft.com/office/officeart/2008/layout/NameandTitleOrganizationalChart"/>
+    <dgm:cxn modelId="{6EE96CD4-457E-4A9B-8A7F-1CA50C09CAD7}" type="presOf" srcId="{C99AAC59-7635-4022-BF61-F1B616ECF97A}" destId="{78214B65-B5FE-4ABF-8A0C-CA99AA9FB35E}" srcOrd="0" destOrd="0" presId="urn:microsoft.com/office/officeart/2008/layout/NameandTitleOrganizationalChart"/>
+    <dgm:cxn modelId="{C8D3A0C7-6FA8-484F-A5DD-962F674AD387}" srcId="{98B8A5A8-2B75-48BA-8041-9C13C210609D}" destId="{E15456C9-1264-44CE-A46A-1332FDEA4D63}" srcOrd="1" destOrd="0" parTransId="{39E5A908-DBFD-4C86-BA62-23E66E1A68F3}" sibTransId="{2DB39D95-EFF2-420B-AFBF-73D10E1400C0}"/>
+    <dgm:cxn modelId="{1984ED6F-6BA0-42AA-BA38-FED598094183}" type="presOf" srcId="{A2CC19FE-4BF6-4187-89D1-510EF69AD1BC}" destId="{6A8BA006-F54F-4C04-BC17-4EA28E8359E9}" srcOrd="0" destOrd="0" presId="urn:microsoft.com/office/officeart/2008/layout/NameandTitleOrganizationalChart"/>
+    <dgm:cxn modelId="{459A5F50-E40A-4351-ADE9-824A6DF7A4EC}" type="presOf" srcId="{09A1C1D9-D891-4DBA-8289-95E3ED6379E3}" destId="{B26AA340-B012-450C-B965-9765131C5F60}" srcOrd="0" destOrd="0" presId="urn:microsoft.com/office/officeart/2008/layout/NameandTitleOrganizationalChart"/>
+    <dgm:cxn modelId="{9A83FF3B-BC19-425C-A1AD-5AFD3FB2AB5D}" type="presOf" srcId="{EDFC95DE-09A1-4484-B91F-4D53C6FCF9B2}" destId="{7B4F4265-1316-4042-90B8-F0270B0983C3}" srcOrd="0" destOrd="0" presId="urn:microsoft.com/office/officeart/2008/layout/NameandTitleOrganizationalChart"/>
+    <dgm:cxn modelId="{E4965599-EF00-41EB-AF3A-35DE7D7F1085}" type="presOf" srcId="{98B8A5A8-2B75-48BA-8041-9C13C210609D}" destId="{5AE64D64-D8C9-4680-89BC-629381485A87}" srcOrd="0" destOrd="0" presId="urn:microsoft.com/office/officeart/2008/layout/NameandTitleOrganizationalChart"/>
+    <dgm:cxn modelId="{C40498F5-47B4-42BE-A6F6-FEB674B8B732}" srcId="{54B22CF6-907D-4AD8-92C4-0399267F5D7A}" destId="{E21412F6-F8B6-4877-B5A3-1D2645173BD3}" srcOrd="0" destOrd="0" parTransId="{6030B236-9283-4C83-A9F7-F5EC8843EAB8}" sibTransId="{80C7A12E-0A37-413C-9B41-A1F036E0B74B}"/>
+    <dgm:cxn modelId="{7524AFAD-10EC-4037-AD99-C8C6CEFF6F3D}" srcId="{E15456C9-1264-44CE-A46A-1332FDEA4D63}" destId="{E5C82CA0-96D5-4FFF-97E4-CCB952C228C7}" srcOrd="0" destOrd="0" parTransId="{C99AAC59-7635-4022-BF61-F1B616ECF97A}" sibTransId="{2E53A8AA-B911-4693-BB93-6A397BC88DBB}"/>
+    <dgm:cxn modelId="{4914C4E4-AAF2-4221-A5B5-C80E45C47DC8}" type="presOf" srcId="{ADE585E9-6E3D-4B4C-859F-3240CF01A0CE}" destId="{0143DD8F-A4C4-4301-8C10-45F38F05B4AE}" srcOrd="0" destOrd="0" presId="urn:microsoft.com/office/officeart/2008/layout/NameandTitleOrganizationalChart"/>
+    <dgm:cxn modelId="{AD4AA747-F3A8-41E2-8B62-868A5B791275}" type="presOf" srcId="{5C8C7E6B-D7EF-4A3D-AB3B-336AE497B83E}" destId="{F380191F-68F7-4007-A4C0-DAB6CB8C3176}" srcOrd="0" destOrd="0" presId="urn:microsoft.com/office/officeart/2008/layout/NameandTitleOrganizationalChart"/>
+    <dgm:cxn modelId="{EDE522AC-1998-47D7-9ADE-6A909B5350C1}" type="presOf" srcId="{4F243CCC-3FAD-4709-ABBB-1E01F32118E7}" destId="{11926B22-8F9E-4EDF-A7DE-30B015AE09F4}" srcOrd="0" destOrd="0" presId="urn:microsoft.com/office/officeart/2008/layout/NameandTitleOrganizationalChart"/>
+    <dgm:cxn modelId="{49DA2137-32CE-45B2-8788-C2FE104ED86F}" type="presOf" srcId="{883F479D-59C7-4D7B-A722-21C7D5F2E269}" destId="{5484D4D6-EA5E-47A9-8B98-31668B75EC0C}" srcOrd="1" destOrd="0" presId="urn:microsoft.com/office/officeart/2008/layout/NameandTitleOrganizationalChart"/>
+    <dgm:cxn modelId="{9A1D5EE3-B47C-4C0B-A30B-F05640F3C9EA}" type="presOf" srcId="{5A315CA4-91DF-4090-B63C-B2A9BD1CE594}" destId="{9A9C2577-DD1A-4A82-A7B5-333FAE126AAA}" srcOrd="1" destOrd="0" presId="urn:microsoft.com/office/officeart/2008/layout/NameandTitleOrganizationalChart"/>
+    <dgm:cxn modelId="{8B02A030-DD4A-4825-BBA1-01431D83BE9D}" srcId="{26E62099-3BC6-4E17-94C4-80340E00CF78}" destId="{1DB3B635-F31A-4C4C-8115-88FD0D07A89B}" srcOrd="7" destOrd="0" parTransId="{73234726-D4B4-4E51-AF5B-87A161E7FD1B}" sibTransId="{EDFC95DE-09A1-4484-B91F-4D53C6FCF9B2}"/>
+    <dgm:cxn modelId="{F7FBAE76-51BF-4FE2-83A1-C675562315AA}" type="presOf" srcId="{883F479D-59C7-4D7B-A722-21C7D5F2E269}" destId="{C0609B87-D118-46F5-A332-3E6628950ABC}" srcOrd="0" destOrd="0" presId="urn:microsoft.com/office/officeart/2008/layout/NameandTitleOrganizationalChart"/>
+    <dgm:cxn modelId="{799ED841-8428-4588-B164-332BCAA758AB}" type="presOf" srcId="{B6D8A5CD-05D7-4BD6-930B-661C00AFF661}" destId="{A94D0759-1843-47BA-952A-DB309C1547CB}" srcOrd="0" destOrd="0" presId="urn:microsoft.com/office/officeart/2008/layout/NameandTitleOrganizationalChart"/>
+    <dgm:cxn modelId="{3879CE63-4658-4A4E-886C-124F05D8F335}" type="presOf" srcId="{958569A8-FBDF-40B8-8EC1-75E2493F7471}" destId="{174A1766-206B-4111-AE1B-3CE3FB67ADE9}" srcOrd="0" destOrd="0" presId="urn:microsoft.com/office/officeart/2008/layout/NameandTitleOrganizationalChart"/>
+    <dgm:cxn modelId="{CFD0DD05-EF3F-4FF8-821B-62DB84BDC2BC}" type="presOf" srcId="{E5C82CA0-96D5-4FFF-97E4-CCB952C228C7}" destId="{F2EC2861-C1D5-4305-8DD5-8D30C9172D41}" srcOrd="0" destOrd="0" presId="urn:microsoft.com/office/officeart/2008/layout/NameandTitleOrganizationalChart"/>
+    <dgm:cxn modelId="{5D1634EF-9423-449A-936C-558A8523DF9E}" srcId="{26E62099-3BC6-4E17-94C4-80340E00CF78}" destId="{958569A8-FBDF-40B8-8EC1-75E2493F7471}" srcOrd="1" destOrd="0" parTransId="{ADE585E9-6E3D-4B4C-859F-3240CF01A0CE}" sibTransId="{683EE9AB-85E6-45CF-95D2-1E792782A3F0}"/>
+    <dgm:cxn modelId="{4C3E9803-E8D3-44A1-A16A-45C3048641D8}" type="presOf" srcId="{22474AD4-F4CF-4F5E-9EEF-94B485CCCEEE}" destId="{03FAE41A-8D29-4C04-BB0D-939DFD4D267A}" srcOrd="0" destOrd="0" presId="urn:microsoft.com/office/officeart/2008/layout/NameandTitleOrganizationalChart"/>
+    <dgm:cxn modelId="{510933DD-F352-4818-ABA6-5F413B0D779F}" type="presOf" srcId="{FF31ECF4-BE1B-44EC-8950-5F3CAA13C9E1}" destId="{328B3935-1432-4F3B-A933-E7FB2D406FF3}" srcOrd="0" destOrd="0" presId="urn:microsoft.com/office/officeart/2008/layout/NameandTitleOrganizationalChart"/>
+    <dgm:cxn modelId="{8E442753-5FE7-40C7-9F69-6012550D209B}" type="presOf" srcId="{E5C82CA0-96D5-4FFF-97E4-CCB952C228C7}" destId="{D6CBF49A-2774-4508-A938-94A33E3AE15D}" srcOrd="1" destOrd="0" presId="urn:microsoft.com/office/officeart/2008/layout/NameandTitleOrganizationalChart"/>
+    <dgm:cxn modelId="{E8FE7C8C-79ED-4A3F-802B-2D22D71D0CE6}" srcId="{9B5504EE-262E-421F-B6D0-17AEEAEBC46F}" destId="{26E62099-3BC6-4E17-94C4-80340E00CF78}" srcOrd="0" destOrd="0" parTransId="{E7A8FCB0-04D3-41C6-A08E-323E962A68EC}" sibTransId="{A2CC19FE-4BF6-4187-89D1-510EF69AD1BC}"/>
+    <dgm:cxn modelId="{2868E610-5452-404F-A51F-DAB7EA695AA8}" srcId="{26E62099-3BC6-4E17-94C4-80340E00CF78}" destId="{5A315CA4-91DF-4090-B63C-B2A9BD1CE594}" srcOrd="4" destOrd="0" parTransId="{1BA13A82-364A-46CA-BDAF-792FE3D2913E}" sibTransId="{09A1C1D9-D891-4DBA-8289-95E3ED6379E3}"/>
+    <dgm:cxn modelId="{5231FEDA-BC49-4C3B-8963-43281F30983F}" type="presOf" srcId="{C52EAC42-BF7A-4839-BED5-3E5C5A8A8F1B}" destId="{2F150A28-35D7-4EDD-AD14-08E30D1702BB}" srcOrd="0" destOrd="0" presId="urn:microsoft.com/office/officeart/2008/layout/NameandTitleOrganizationalChart"/>
+    <dgm:cxn modelId="{FEE25D98-22C5-4650-8A39-9067A367BDF7}" type="presOf" srcId="{340911AF-DD18-4E72-8A97-F432B6E4DC21}" destId="{9E007C76-6257-47A8-B735-63EA3D7A08C8}" srcOrd="0" destOrd="0" presId="urn:microsoft.com/office/officeart/2008/layout/NameandTitleOrganizationalChart"/>
+    <dgm:cxn modelId="{1929A109-36A0-4ED7-AF6E-66A8CBAB8D6F}" type="presOf" srcId="{4410F5B9-7A6E-4352-ABF4-75B25389A9D8}" destId="{852CC1FF-77EF-4779-8EFB-E14E8E9A70F0}" srcOrd="0" destOrd="0" presId="urn:microsoft.com/office/officeart/2008/layout/NameandTitleOrganizationalChart"/>
+    <dgm:cxn modelId="{A6AC8E80-2487-43ED-9838-97067A7C4B25}" type="presOf" srcId="{9B5504EE-262E-421F-B6D0-17AEEAEBC46F}" destId="{AA25AFFA-8FB6-4FBD-91FE-E98622B57003}" srcOrd="1" destOrd="0" presId="urn:microsoft.com/office/officeart/2008/layout/NameandTitleOrganizationalChart"/>
+    <dgm:cxn modelId="{E58687E5-907C-4887-BFCE-D1362041C656}" srcId="{26E62099-3BC6-4E17-94C4-80340E00CF78}" destId="{4410F5B9-7A6E-4352-ABF4-75B25389A9D8}" srcOrd="6" destOrd="0" parTransId="{4F243CCC-3FAD-4709-ABBB-1E01F32118E7}" sibTransId="{E6172D37-089F-4CBC-86F1-74615E51D65C}"/>
+    <dgm:cxn modelId="{6DC686FA-0917-49BE-8723-A8497165DF32}" type="presOf" srcId="{F8540D8F-842D-4728-AB5D-7C88723AA44D}" destId="{EB130543-171C-469C-8ADC-A5057937F01C}" srcOrd="1" destOrd="0" presId="urn:microsoft.com/office/officeart/2008/layout/NameandTitleOrganizationalChart"/>
+    <dgm:cxn modelId="{CA1E94D0-87CB-4923-8A1A-042EAC7E4FE4}" type="presOf" srcId="{671859CD-AA71-42FD-8258-61968ACB1064}" destId="{D80B2E31-E433-4D95-9026-4A5890030DC1}" srcOrd="0" destOrd="0" presId="urn:microsoft.com/office/officeart/2008/layout/NameandTitleOrganizationalChart"/>
+    <dgm:cxn modelId="{DA4E049E-0A78-4696-9E9D-868C97B66396}" type="presOf" srcId="{5D122C4F-1DBD-4CF7-AC9C-40B0E92DBFB9}" destId="{1683A76A-8157-4355-B30D-E69C1BB81D29}" srcOrd="0" destOrd="0" presId="urn:microsoft.com/office/officeart/2008/layout/NameandTitleOrganizationalChart"/>
+    <dgm:cxn modelId="{1E4DCA70-8828-445A-BBBD-F46A4D6559FA}" type="presOf" srcId="{1DB3B635-F31A-4C4C-8115-88FD0D07A89B}" destId="{15163E45-73E6-4B5D-9ADE-F62FE47442B3}" srcOrd="1" destOrd="0" presId="urn:microsoft.com/office/officeart/2008/layout/NameandTitleOrganizationalChart"/>
+    <dgm:cxn modelId="{3C211975-121F-45F3-B1AD-81FD579A7BD1}" type="presOf" srcId="{E7A8FCB0-04D3-41C6-A08E-323E962A68EC}" destId="{2F41E6E4-21D3-4C31-927E-F82D7255BF4B}" srcOrd="0" destOrd="0" presId="urn:microsoft.com/office/officeart/2008/layout/NameandTitleOrganizationalChart"/>
+    <dgm:cxn modelId="{EE20E7E3-1327-488C-8C80-A438682BDA80}" srcId="{98B8A5A8-2B75-48BA-8041-9C13C210609D}" destId="{B6D8A5CD-05D7-4BD6-930B-661C00AFF661}" srcOrd="0" destOrd="0" parTransId="{137D738E-0763-4C51-954A-7A8DBDB5FFD6}" sibTransId="{B91C093C-03B1-401C-8462-11DC6CC3E891}"/>
+    <dgm:cxn modelId="{ED962AA3-389A-4A4C-ACCF-38D449A94292}" type="presOf" srcId="{D00CBC1A-4C8F-442F-85CC-7F86597AB3FD}" destId="{027F8FCE-D917-4857-957E-F5F0B0853751}" srcOrd="0" destOrd="0" presId="urn:microsoft.com/office/officeart/2008/layout/NameandTitleOrganizationalChart"/>
+    <dgm:cxn modelId="{F3BD405A-563A-4F43-BF87-634E760B4329}" type="presOf" srcId="{E21412F6-F8B6-4877-B5A3-1D2645173BD3}" destId="{55A454FB-B4B0-428E-976C-67FBFF903016}" srcOrd="0" destOrd="0" presId="urn:microsoft.com/office/officeart/2008/layout/NameandTitleOrganizationalChart"/>
+    <dgm:cxn modelId="{EB7CAFE1-D98F-4216-9E9F-70CE96A3AFCD}" type="presOf" srcId="{1DB3B635-F31A-4C4C-8115-88FD0D07A89B}" destId="{678B0968-8AF6-409D-A455-6407459F1796}" srcOrd="0" destOrd="0" presId="urn:microsoft.com/office/officeart/2008/layout/NameandTitleOrganizationalChart"/>
+    <dgm:cxn modelId="{5CCF456C-82CA-4E97-AD18-41205CD6CEF8}" type="presOf" srcId="{A70E35BE-CEE2-47FF-9BB0-05D25DCD34F7}" destId="{5423C0B6-E270-4795-A26B-83CFD7EB47D0}" srcOrd="0" destOrd="0" presId="urn:microsoft.com/office/officeart/2008/layout/NameandTitleOrganizationalChart"/>
+    <dgm:cxn modelId="{3C545EF2-73C6-4008-A416-65C36013DC82}" type="presOf" srcId="{A3C83099-6BFA-44E1-B0A9-C07070F4815D}" destId="{687579E5-F4F4-4EF1-A1AC-287D3B03AD65}" srcOrd="0" destOrd="0" presId="urn:microsoft.com/office/officeart/2008/layout/NameandTitleOrganizationalChart"/>
+    <dgm:cxn modelId="{D258D4DD-ECCB-48FE-9D54-1783765B822A}" type="presOf" srcId="{2D592857-C4FF-4259-AB7B-8B5F06639A90}" destId="{DC2A6A67-D1A7-48DB-9C30-2EE5AE05E793}" srcOrd="0" destOrd="0" presId="urn:microsoft.com/office/officeart/2008/layout/NameandTitleOrganizationalChart"/>
+    <dgm:cxn modelId="{B66F2A30-A1ED-48E4-B117-351831710BE1}" type="presOf" srcId="{2E53A8AA-B911-4693-BB93-6A397BC88DBB}" destId="{8BD8E232-E0DA-4845-818E-EA2EBBC9B0BB}" srcOrd="0" destOrd="0" presId="urn:microsoft.com/office/officeart/2008/layout/NameandTitleOrganizationalChart"/>
+    <dgm:cxn modelId="{A55DAE1E-7E21-4068-B3EE-5F4449C89E3A}" type="presOf" srcId="{2D592857-C4FF-4259-AB7B-8B5F06639A90}" destId="{E8B83CC0-9D3E-44F2-A4A5-337005BA78F2}" srcOrd="1" destOrd="0" presId="urn:microsoft.com/office/officeart/2008/layout/NameandTitleOrganizationalChart"/>
+    <dgm:cxn modelId="{C304C483-1398-4D23-8714-1DF19EBBA93D}" type="presOf" srcId="{E5511235-BB9F-44F7-929B-94718C9EFAFA}" destId="{CE6787A3-DAC8-481D-B157-911057EA0482}" srcOrd="0" destOrd="0" presId="urn:microsoft.com/office/officeart/2008/layout/NameandTitleOrganizationalChart"/>
+    <dgm:cxn modelId="{9A614BF6-9632-4039-9F89-577185A54E8C}" type="presOf" srcId="{9AC7ACC0-2733-4A78-B5DD-2F568ABCC62C}" destId="{8CCE3855-BA01-4ECE-80AC-CE4B31DD7EA3}" srcOrd="0" destOrd="0" presId="urn:microsoft.com/office/officeart/2008/layout/NameandTitleOrganizationalChart"/>
+    <dgm:cxn modelId="{6135A471-DC54-4446-AFF5-C5698C41DED9}" type="presOf" srcId="{A70E35BE-CEE2-47FF-9BB0-05D25DCD34F7}" destId="{24F63BB3-C32E-42DD-BEA1-A5D4C283A3E4}" srcOrd="1" destOrd="0" presId="urn:microsoft.com/office/officeart/2008/layout/NameandTitleOrganizationalChart"/>
+    <dgm:cxn modelId="{DC789776-2708-48A0-A156-249D6BCC4A00}" type="presOf" srcId="{0A0BA593-C895-453D-A9EA-AA1A6EF12F21}" destId="{8E6E4251-BCF8-4FB1-A02B-56F8FA370E84}" srcOrd="0" destOrd="0" presId="urn:microsoft.com/office/officeart/2008/layout/NameandTitleOrganizationalChart"/>
+    <dgm:cxn modelId="{6DE6D761-5EEE-4A09-A159-D4DF8131D69D}" srcId="{E15456C9-1264-44CE-A46A-1332FDEA4D63}" destId="{FF31ECF4-BE1B-44EC-8950-5F3CAA13C9E1}" srcOrd="1" destOrd="0" parTransId="{C52EAC42-BF7A-4839-BED5-3E5C5A8A8F1B}" sibTransId="{A3C83099-6BFA-44E1-B0A9-C07070F4815D}"/>
+    <dgm:cxn modelId="{4C7FDF7A-2C12-4A32-9B94-2DF93C653F5E}" type="presOf" srcId="{80C7A12E-0A37-413C-9B41-A1F036E0B74B}" destId="{9226003C-DEC8-4030-B965-31A76FE09775}" srcOrd="0" destOrd="0" presId="urn:microsoft.com/office/officeart/2008/layout/NameandTitleOrganizationalChart"/>
+    <dgm:cxn modelId="{BDF60283-5D13-4A6C-A565-5717718CB5B1}" type="presOf" srcId="{6F3ABB5B-4390-4D4C-A351-C086BA6E696F}" destId="{2583DDCA-D066-4957-A24E-5145344FEE1F}" srcOrd="1" destOrd="0" presId="urn:microsoft.com/office/officeart/2008/layout/NameandTitleOrganizationalChart"/>
+    <dgm:cxn modelId="{7C24D88A-BD01-4EE3-8E41-5C7A1E908B39}" type="presOf" srcId="{E6172D37-089F-4CBC-86F1-74615E51D65C}" destId="{E71EE907-1921-4348-A4A3-ACB8222C7F4E}" srcOrd="0" destOrd="0" presId="urn:microsoft.com/office/officeart/2008/layout/NameandTitleOrganizationalChart"/>
+    <dgm:cxn modelId="{35756D35-91AF-41B6-A68D-6C51AA758800}" type="presOf" srcId="{98B8A5A8-2B75-48BA-8041-9C13C210609D}" destId="{29297073-770B-4E74-8A71-652F4D35C065}" srcOrd="1" destOrd="0" presId="urn:microsoft.com/office/officeart/2008/layout/NameandTitleOrganizationalChart"/>
+    <dgm:cxn modelId="{E4E45663-9788-43E5-BC6E-E0773C6455FD}" srcId="{26E62099-3BC6-4E17-94C4-80340E00CF78}" destId="{A70E35BE-CEE2-47FF-9BB0-05D25DCD34F7}" srcOrd="5" destOrd="0" parTransId="{2B66A6E6-4414-4871-A4F4-78792B81DA7C}" sibTransId="{0A0BA593-C895-453D-A9EA-AA1A6EF12F21}"/>
+    <dgm:cxn modelId="{B6C74065-225D-41AC-BA1E-6F23FD857995}" type="presOf" srcId="{B6D8A5CD-05D7-4BD6-930B-661C00AFF661}" destId="{02C004B2-63B3-4608-9345-22E9CC3E868C}" srcOrd="1" destOrd="0" presId="urn:microsoft.com/office/officeart/2008/layout/NameandTitleOrganizationalChart"/>
+    <dgm:cxn modelId="{FB307CD8-E50C-45B3-BD27-D0AB169E3089}" type="presOf" srcId="{683EE9AB-85E6-45CF-95D2-1E792782A3F0}" destId="{78F2497E-04CA-49DC-A332-809969CCAB06}" srcOrd="0" destOrd="0" presId="urn:microsoft.com/office/officeart/2008/layout/NameandTitleOrganizationalChart"/>
+    <dgm:cxn modelId="{2C07ABD4-9DC0-44C9-AB30-147C012BEC8F}" type="presOf" srcId="{39E5A908-DBFD-4C86-BA62-23E66E1A68F3}" destId="{2949CF0C-287F-4175-BF06-92EAB5C96BB2}" srcOrd="0" destOrd="0" presId="urn:microsoft.com/office/officeart/2008/layout/NameandTitleOrganizationalChart"/>
+    <dgm:cxn modelId="{1CDDE4D3-BE72-4D1E-8783-DCDA1BD8EA73}" type="presOf" srcId="{86D205F2-DF1C-4523-A1B4-E357476C5541}" destId="{27B90BA2-B19F-4A36-867A-F1E7855C18E8}" srcOrd="0" destOrd="0" presId="urn:microsoft.com/office/officeart/2008/layout/NameandTitleOrganizationalChart"/>
+    <dgm:cxn modelId="{664BC9D2-775A-4D58-8D7C-5D2A3A5B6BD4}" type="presOf" srcId="{559F360A-D66E-4968-B66A-04F022DA2384}" destId="{3518303C-ED68-41C8-B9F7-05B65142A32E}" srcOrd="0" destOrd="0" presId="urn:microsoft.com/office/officeart/2008/layout/NameandTitleOrganizationalChart"/>
+    <dgm:cxn modelId="{C07726E5-5B03-4688-8568-4C5BE59A43A5}" srcId="{FF31ECF4-BE1B-44EC-8950-5F3CAA13C9E1}" destId="{9B5504EE-262E-421F-B6D0-17AEEAEBC46F}" srcOrd="1" destOrd="0" parTransId="{1D5B3EF4-BE0A-4BBA-AC69-B7F49B651F6F}" sibTransId="{1A23467C-A501-4E71-A007-E39C51AAC1F6}"/>
+    <dgm:cxn modelId="{D177B034-36AA-4270-85B4-F29F558921DF}" type="presOf" srcId="{26E62099-3BC6-4E17-94C4-80340E00CF78}" destId="{61C16C2F-1AB1-4997-8CC1-7C7DF3B62E00}" srcOrd="0" destOrd="0" presId="urn:microsoft.com/office/officeart/2008/layout/NameandTitleOrganizationalChart"/>
+    <dgm:cxn modelId="{1395BB25-83DC-4725-BF82-B651497F5871}" srcId="{FF31ECF4-BE1B-44EC-8950-5F3CAA13C9E1}" destId="{6F3ABB5B-4390-4D4C-A351-C086BA6E696F}" srcOrd="0" destOrd="0" parTransId="{5D122C4F-1DBD-4CF7-AC9C-40B0E92DBFB9}" sibTransId="{D00CBC1A-4C8F-442F-85CC-7F86597AB3FD}"/>
+    <dgm:cxn modelId="{4F8DF260-2437-4352-90CA-080BD6C25F3B}" type="presOf" srcId="{6F3ABB5B-4390-4D4C-A351-C086BA6E696F}" destId="{07B41DA2-F050-42A9-BE37-EBD07D6F544E}" srcOrd="0" destOrd="0" presId="urn:microsoft.com/office/officeart/2008/layout/NameandTitleOrganizationalChart"/>
     <dgm:cxn modelId="{E17C04C7-3BC8-49B8-8034-D454BD3992E6}" type="presOf" srcId="{137D738E-0763-4C51-954A-7A8DBDB5FFD6}" destId="{149849EB-D923-46C4-BECF-830EBC9491A6}" srcOrd="0" destOrd="0" presId="urn:microsoft.com/office/officeart/2008/layout/NameandTitleOrganizationalChart"/>
     <dgm:cxn modelId="{18FF4AE5-2227-4C9B-8DC9-949D2FAE77E2}" type="presOf" srcId="{4410F5B9-7A6E-4352-ABF4-75B25389A9D8}" destId="{38458C37-D2BB-4264-934F-474B04033A2B}" srcOrd="1" destOrd="0" presId="urn:microsoft.com/office/officeart/2008/layout/NameandTitleOrganizationalChart"/>
-    <dgm:cxn modelId="{35756D35-91AF-41B6-A68D-6C51AA758800}" type="presOf" srcId="{98B8A5A8-2B75-48BA-8041-9C13C210609D}" destId="{29297073-770B-4E74-8A71-652F4D35C065}" srcOrd="1" destOrd="0" presId="urn:microsoft.com/office/officeart/2008/layout/NameandTitleOrganizationalChart"/>
-    <dgm:cxn modelId="{4C7FDF7A-2C12-4A32-9B94-2DF93C653F5E}" type="presOf" srcId="{80C7A12E-0A37-413C-9B41-A1F036E0B74B}" destId="{9226003C-DEC8-4030-B965-31A76FE09775}" srcOrd="0" destOrd="0" presId="urn:microsoft.com/office/officeart/2008/layout/NameandTitleOrganizationalChart"/>
-    <dgm:cxn modelId="{6DC686FA-0917-49BE-8723-A8497165DF32}" type="presOf" srcId="{F8540D8F-842D-4728-AB5D-7C88723AA44D}" destId="{EB130543-171C-469C-8ADC-A5057937F01C}" srcOrd="1" destOrd="0" presId="urn:microsoft.com/office/officeart/2008/layout/NameandTitleOrganizationalChart"/>
-    <dgm:cxn modelId="{C304C483-1398-4D23-8714-1DF19EBBA93D}" type="presOf" srcId="{E5511235-BB9F-44F7-929B-94718C9EFAFA}" destId="{CE6787A3-DAC8-481D-B157-911057EA0482}" srcOrd="0" destOrd="0" presId="urn:microsoft.com/office/officeart/2008/layout/NameandTitleOrganizationalChart"/>
-    <dgm:cxn modelId="{DA4E049E-0A78-4696-9E9D-868C97B66396}" type="presOf" srcId="{5D122C4F-1DBD-4CF7-AC9C-40B0E92DBFB9}" destId="{1683A76A-8157-4355-B30D-E69C1BB81D29}" srcOrd="0" destOrd="0" presId="urn:microsoft.com/office/officeart/2008/layout/NameandTitleOrganizationalChart"/>
-    <dgm:cxn modelId="{7524AFAD-10EC-4037-AD99-C8C6CEFF6F3D}" srcId="{E15456C9-1264-44CE-A46A-1332FDEA4D63}" destId="{E5C82CA0-96D5-4FFF-97E4-CCB952C228C7}" srcOrd="0" destOrd="0" parTransId="{C99AAC59-7635-4022-BF61-F1B616ECF97A}" sibTransId="{2E53A8AA-B911-4693-BB93-6A397BC88DBB}"/>
-    <dgm:cxn modelId="{FB307CD8-E50C-45B3-BD27-D0AB169E3089}" type="presOf" srcId="{683EE9AB-85E6-45CF-95D2-1E792782A3F0}" destId="{78F2497E-04CA-49DC-A332-809969CCAB06}" srcOrd="0" destOrd="0" presId="urn:microsoft.com/office/officeart/2008/layout/NameandTitleOrganizationalChart"/>
-    <dgm:cxn modelId="{EE20E7E3-1327-488C-8C80-A438682BDA80}" srcId="{98B8A5A8-2B75-48BA-8041-9C13C210609D}" destId="{B6D8A5CD-05D7-4BD6-930B-661C00AFF661}" srcOrd="0" destOrd="0" parTransId="{137D738E-0763-4C51-954A-7A8DBDB5FFD6}" sibTransId="{B91C093C-03B1-401C-8462-11DC6CC3E891}"/>
-    <dgm:cxn modelId="{1CDDE4D3-BE72-4D1E-8783-DCDA1BD8EA73}" type="presOf" srcId="{86D205F2-DF1C-4523-A1B4-E357476C5541}" destId="{27B90BA2-B19F-4A36-867A-F1E7855C18E8}" srcOrd="0" destOrd="0" presId="urn:microsoft.com/office/officeart/2008/layout/NameandTitleOrganizationalChart"/>
-    <dgm:cxn modelId="{CFD0DD05-EF3F-4FF8-821B-62DB84BDC2BC}" type="presOf" srcId="{E5C82CA0-96D5-4FFF-97E4-CCB952C228C7}" destId="{F2EC2861-C1D5-4305-8DD5-8D30C9172D41}" srcOrd="0" destOrd="0" presId="urn:microsoft.com/office/officeart/2008/layout/NameandTitleOrganizationalChart"/>
-    <dgm:cxn modelId="{DC759365-E7CE-4E2A-A392-A4CA80235CC3}" type="presOf" srcId="{F8540D8F-842D-4728-AB5D-7C88723AA44D}" destId="{2875948E-291D-4655-9A40-01DD961864D7}" srcOrd="0" destOrd="0" presId="urn:microsoft.com/office/officeart/2008/layout/NameandTitleOrganizationalChart"/>
-    <dgm:cxn modelId="{F7FBAE76-51BF-4FE2-83A1-C675562315AA}" type="presOf" srcId="{883F479D-59C7-4D7B-A722-21C7D5F2E269}" destId="{C0609B87-D118-46F5-A332-3E6628950ABC}" srcOrd="0" destOrd="0" presId="urn:microsoft.com/office/officeart/2008/layout/NameandTitleOrganizationalChart"/>
-    <dgm:cxn modelId="{E58687E5-907C-4887-BFCE-D1362041C656}" srcId="{26E62099-3BC6-4E17-94C4-80340E00CF78}" destId="{4410F5B9-7A6E-4352-ABF4-75B25389A9D8}" srcOrd="6" destOrd="0" parTransId="{4F243CCC-3FAD-4709-ABBB-1E01F32118E7}" sibTransId="{E6172D37-089F-4CBC-86F1-74615E51D65C}"/>
-    <dgm:cxn modelId="{6135A471-DC54-4446-AFF5-C5698C41DED9}" type="presOf" srcId="{A70E35BE-CEE2-47FF-9BB0-05D25DCD34F7}" destId="{24F63BB3-C32E-42DD-BEA1-A5D4C283A3E4}" srcOrd="1" destOrd="0" presId="urn:microsoft.com/office/officeart/2008/layout/NameandTitleOrganizationalChart"/>
-    <dgm:cxn modelId="{BAE672C5-5CB7-4479-BB59-CCD465556D62}" srcId="{26E62099-3BC6-4E17-94C4-80340E00CF78}" destId="{883F479D-59C7-4D7B-A722-21C7D5F2E269}" srcOrd="0" destOrd="0" parTransId="{90F310DB-8B4B-4A3C-BC11-30000B3AF5E0}" sibTransId="{E5511235-BB9F-44F7-929B-94718C9EFAFA}"/>
-    <dgm:cxn modelId="{FEE25D98-22C5-4650-8A39-9067A367BDF7}" type="presOf" srcId="{340911AF-DD18-4E72-8A97-F432B6E4DC21}" destId="{9E007C76-6257-47A8-B735-63EA3D7A08C8}" srcOrd="0" destOrd="0" presId="urn:microsoft.com/office/officeart/2008/layout/NameandTitleOrganizationalChart"/>
-    <dgm:cxn modelId="{D177B034-36AA-4270-85B4-F29F558921DF}" type="presOf" srcId="{26E62099-3BC6-4E17-94C4-80340E00CF78}" destId="{61C16C2F-1AB1-4997-8CC1-7C7DF3B62E00}" srcOrd="0" destOrd="0" presId="urn:microsoft.com/office/officeart/2008/layout/NameandTitleOrganizationalChart"/>
-    <dgm:cxn modelId="{3C211975-121F-45F3-B1AD-81FD579A7BD1}" type="presOf" srcId="{E7A8FCB0-04D3-41C6-A08E-323E962A68EC}" destId="{2F41E6E4-21D3-4C31-927E-F82D7255BF4B}" srcOrd="0" destOrd="0" presId="urn:microsoft.com/office/officeart/2008/layout/NameandTitleOrganizationalChart"/>
-    <dgm:cxn modelId="{510933DD-F352-4818-ABA6-5F413B0D779F}" type="presOf" srcId="{FF31ECF4-BE1B-44EC-8950-5F3CAA13C9E1}" destId="{328B3935-1432-4F3B-A933-E7FB2D406FF3}" srcOrd="0" destOrd="0" presId="urn:microsoft.com/office/officeart/2008/layout/NameandTitleOrganizationalChart"/>
-    <dgm:cxn modelId="{DB4AF635-17EA-4D60-B6BA-EA341A022A10}" type="presOf" srcId="{FF31ECF4-BE1B-44EC-8950-5F3CAA13C9E1}" destId="{28AA62B0-0144-4478-95AE-6BB68EA28D13}" srcOrd="1" destOrd="0" presId="urn:microsoft.com/office/officeart/2008/layout/NameandTitleOrganizationalChart"/>
-    <dgm:cxn modelId="{5CCF456C-82CA-4E97-AD18-41205CD6CEF8}" type="presOf" srcId="{A70E35BE-CEE2-47FF-9BB0-05D25DCD34F7}" destId="{5423C0B6-E270-4795-A26B-83CFD7EB47D0}" srcOrd="0" destOrd="0" presId="urn:microsoft.com/office/officeart/2008/layout/NameandTitleOrganizationalChart"/>
-    <dgm:cxn modelId="{BDF60283-5D13-4A6C-A565-5717718CB5B1}" type="presOf" srcId="{6F3ABB5B-4390-4D4C-A351-C086BA6E696F}" destId="{2583DDCA-D066-4957-A24E-5145344FEE1F}" srcOrd="1" destOrd="0" presId="urn:microsoft.com/office/officeart/2008/layout/NameandTitleOrganizationalChart"/>
-    <dgm:cxn modelId="{D45B13F4-EE30-4A90-A695-882535BB06BD}" type="presOf" srcId="{E15456C9-1264-44CE-A46A-1332FDEA4D63}" destId="{AAFD393B-D5C6-4FC1-85BB-67D689A5CB66}" srcOrd="0" destOrd="0" presId="urn:microsoft.com/office/officeart/2008/layout/NameandTitleOrganizationalChart"/>
-    <dgm:cxn modelId="{EDE522AC-1998-47D7-9ADE-6A909B5350C1}" type="presOf" srcId="{4F243CCC-3FAD-4709-ABBB-1E01F32118E7}" destId="{11926B22-8F9E-4EDF-A7DE-30B015AE09F4}" srcOrd="0" destOrd="0" presId="urn:microsoft.com/office/officeart/2008/layout/NameandTitleOrganizationalChart"/>
-    <dgm:cxn modelId="{45538FA5-7565-4DE4-99EA-FB48FEB30107}" type="presOf" srcId="{E15456C9-1264-44CE-A46A-1332FDEA4D63}" destId="{1D71B1E5-6B39-4842-94CA-612907EC3818}" srcOrd="1" destOrd="0" presId="urn:microsoft.com/office/officeart/2008/layout/NameandTitleOrganizationalChart"/>
-    <dgm:cxn modelId="{A6AC8E80-2487-43ED-9838-97067A7C4B25}" type="presOf" srcId="{9B5504EE-262E-421F-B6D0-17AEEAEBC46F}" destId="{AA25AFFA-8FB6-4FBD-91FE-E98622B57003}" srcOrd="1" destOrd="0" presId="urn:microsoft.com/office/officeart/2008/layout/NameandTitleOrganizationalChart"/>
-    <dgm:cxn modelId="{5D1634EF-9423-449A-936C-558A8523DF9E}" srcId="{26E62099-3BC6-4E17-94C4-80340E00CF78}" destId="{958569A8-FBDF-40B8-8EC1-75E2493F7471}" srcOrd="1" destOrd="0" parTransId="{ADE585E9-6E3D-4B4C-859F-3240CF01A0CE}" sibTransId="{683EE9AB-85E6-45CF-95D2-1E792782A3F0}"/>
-    <dgm:cxn modelId="{4C3E9803-E8D3-44A1-A16A-45C3048641D8}" type="presOf" srcId="{22474AD4-F4CF-4F5E-9EEF-94B485CCCEEE}" destId="{03FAE41A-8D29-4C04-BB0D-939DFD4D267A}" srcOrd="0" destOrd="0" presId="urn:microsoft.com/office/officeart/2008/layout/NameandTitleOrganizationalChart"/>
-    <dgm:cxn modelId="{E4965599-EF00-41EB-AF3A-35DE7D7F1085}" type="presOf" srcId="{98B8A5A8-2B75-48BA-8041-9C13C210609D}" destId="{5AE64D64-D8C9-4680-89BC-629381485A87}" srcOrd="0" destOrd="0" presId="urn:microsoft.com/office/officeart/2008/layout/NameandTitleOrganizationalChart"/>
-    <dgm:cxn modelId="{3879CE63-4658-4A4E-886C-124F05D8F335}" type="presOf" srcId="{958569A8-FBDF-40B8-8EC1-75E2493F7471}" destId="{174A1766-206B-4111-AE1B-3CE3FB67ADE9}" srcOrd="0" destOrd="0" presId="urn:microsoft.com/office/officeart/2008/layout/NameandTitleOrganizationalChart"/>
-    <dgm:cxn modelId="{A6F377CB-C53E-4C6C-97CB-EEE17BB8EA2E}" type="presOf" srcId="{AB091C5F-1C2B-4511-A681-D7B94BC00380}" destId="{50939023-49D7-4F51-AD1D-21231C706D1C}" srcOrd="0" destOrd="0" presId="urn:microsoft.com/office/officeart/2008/layout/NameandTitleOrganizationalChart"/>
-    <dgm:cxn modelId="{2868E610-5452-404F-A51F-DAB7EA695AA8}" srcId="{26E62099-3BC6-4E17-94C4-80340E00CF78}" destId="{5A315CA4-91DF-4090-B63C-B2A9BD1CE594}" srcOrd="4" destOrd="0" parTransId="{1BA13A82-364A-46CA-BDAF-792FE3D2913E}" sibTransId="{09A1C1D9-D891-4DBA-8289-95E3ED6379E3}"/>
-    <dgm:cxn modelId="{ED962AA3-389A-4A4C-ACCF-38D449A94292}" type="presOf" srcId="{D00CBC1A-4C8F-442F-85CC-7F86597AB3FD}" destId="{027F8FCE-D917-4857-957E-F5F0B0853751}" srcOrd="0" destOrd="0" presId="urn:microsoft.com/office/officeart/2008/layout/NameandTitleOrganizationalChart"/>
+    <dgm:cxn modelId="{7D76912B-BC23-4BC8-A44A-325E20BA1BE4}" type="presOf" srcId="{958569A8-FBDF-40B8-8EC1-75E2493F7471}" destId="{A1DD215B-CBF1-4A51-8AC4-400394873ED5}" srcOrd="1" destOrd="0" presId="urn:microsoft.com/office/officeart/2008/layout/NameandTitleOrganizationalChart"/>
+    <dgm:cxn modelId="{2EFF13AC-45AE-4F59-826B-7B02BC00AAEE}" type="presOf" srcId="{73234726-D4B4-4E51-AF5B-87A161E7FD1B}" destId="{4443E3C1-7F39-4CEC-910A-DF31A2168070}" srcOrd="0" destOrd="0" presId="urn:microsoft.com/office/officeart/2008/layout/NameandTitleOrganizationalChart"/>
     <dgm:cxn modelId="{E1531FA5-5958-4637-ADEA-D3F9BF47D943}" type="presOf" srcId="{1A23467C-A501-4E71-A007-E39C51AAC1F6}" destId="{126715BD-2D7F-433C-A680-62D83EF674C2}" srcOrd="0" destOrd="0" presId="urn:microsoft.com/office/officeart/2008/layout/NameandTitleOrganizationalChart"/>
     <dgm:cxn modelId="{5024D8DF-F1E7-40C6-A08D-500D0399C3E4}" type="presOf" srcId="{04E9ED99-3317-4ECF-B07D-F4E9BFEAC8A0}" destId="{8BF21DA7-9255-410A-95A8-70E045BB35D3}" srcOrd="0" destOrd="0" presId="urn:microsoft.com/office/officeart/2008/layout/NameandTitleOrganizationalChart"/>
-    <dgm:cxn modelId="{9A83FF3B-BC19-425C-A1AD-5AFD3FB2AB5D}" type="presOf" srcId="{EDFC95DE-09A1-4484-B91F-4D53C6FCF9B2}" destId="{7B4F4265-1316-4042-90B8-F0270B0983C3}" srcOrd="0" destOrd="0" presId="urn:microsoft.com/office/officeart/2008/layout/NameandTitleOrganizationalChart"/>
-    <dgm:cxn modelId="{664BC9D2-775A-4D58-8D7C-5D2A3A5B6BD4}" type="presOf" srcId="{559F360A-D66E-4968-B66A-04F022DA2384}" destId="{3518303C-ED68-41C8-B9F7-05B65142A32E}" srcOrd="0" destOrd="0" presId="urn:microsoft.com/office/officeart/2008/layout/NameandTitleOrganizationalChart"/>
+    <dgm:cxn modelId="{DC759365-E7CE-4E2A-A392-A4CA80235CC3}" type="presOf" srcId="{F8540D8F-842D-4728-AB5D-7C88723AA44D}" destId="{2875948E-291D-4655-9A40-01DD961864D7}" srcOrd="0" destOrd="0" presId="urn:microsoft.com/office/officeart/2008/layout/NameandTitleOrganizationalChart"/>
+    <dgm:cxn modelId="{9366031C-995F-44DC-BBF1-4AE44545418F}" type="presOf" srcId="{E21412F6-F8B6-4877-B5A3-1D2645173BD3}" destId="{25BCDCA1-7378-4966-BF53-CF07D25A4218}" srcOrd="1" destOrd="0" presId="urn:microsoft.com/office/officeart/2008/layout/NameandTitleOrganizationalChart"/>
     <dgm:cxn modelId="{9B99A35B-E0D7-4CC5-A643-762707BEC098}" type="presOf" srcId="{1D5B3EF4-BE0A-4BBA-AC69-B7F49B651F6F}" destId="{54644C48-106A-4DDE-967E-9C553AFFCB26}" srcOrd="0" destOrd="0" presId="urn:microsoft.com/office/officeart/2008/layout/NameandTitleOrganizationalChart"/>
-    <dgm:cxn modelId="{1E4DCA70-8828-445A-BBBD-F46A4D6559FA}" type="presOf" srcId="{1DB3B635-F31A-4C4C-8115-88FD0D07A89B}" destId="{15163E45-73E6-4B5D-9ADE-F62FE47442B3}" srcOrd="1" destOrd="0" presId="urn:microsoft.com/office/officeart/2008/layout/NameandTitleOrganizationalChart"/>
-    <dgm:cxn modelId="{1984ED6F-6BA0-42AA-BA38-FED598094183}" type="presOf" srcId="{A2CC19FE-4BF6-4187-89D1-510EF69AD1BC}" destId="{6A8BA006-F54F-4C04-BC17-4EA28E8359E9}" srcOrd="0" destOrd="0" presId="urn:microsoft.com/office/officeart/2008/layout/NameandTitleOrganizationalChart"/>
+    <dgm:cxn modelId="{FFAE1BB5-1BF0-402C-95E4-8A4CBAECB1A6}" type="presOf" srcId="{5A315CA4-91DF-4090-B63C-B2A9BD1CE594}" destId="{B2CC1828-1D29-48FA-A0DC-F04CA0CD2D21}" srcOrd="0" destOrd="0" presId="urn:microsoft.com/office/officeart/2008/layout/NameandTitleOrganizationalChart"/>
+    <dgm:cxn modelId="{707D05A3-E703-4684-9DF9-F903169F64F5}" srcId="{26E62099-3BC6-4E17-94C4-80340E00CF78}" destId="{04E9ED99-3317-4ECF-B07D-F4E9BFEAC8A0}" srcOrd="2" destOrd="0" parTransId="{22474AD4-F4CF-4F5E-9EEF-94B485CCCEEE}" sibTransId="{5C8C7E6B-D7EF-4A3D-AB3B-336AE497B83E}"/>
+    <dgm:cxn modelId="{D88B736C-D59B-46BA-BD02-312C7950D290}" type="presOf" srcId="{26E62099-3BC6-4E17-94C4-80340E00CF78}" destId="{99D4E039-A8D0-4953-9B21-FAC1C94D5CE2}" srcOrd="1" destOrd="0" presId="urn:microsoft.com/office/officeart/2008/layout/NameandTitleOrganizationalChart"/>
+    <dgm:cxn modelId="{7A8BAA46-4AC7-4D99-A870-B576128DA040}" srcId="{E21412F6-F8B6-4877-B5A3-1D2645173BD3}" destId="{F8540D8F-842D-4728-AB5D-7C88723AA44D}" srcOrd="0" destOrd="0" parTransId="{9AC7ACC0-2733-4A78-B5DD-2F568ABCC62C}" sibTransId="{86D205F2-DF1C-4523-A1B4-E357476C5541}"/>
+    <dgm:cxn modelId="{45538FA5-7565-4DE4-99EA-FB48FEB30107}" type="presOf" srcId="{E15456C9-1264-44CE-A46A-1332FDEA4D63}" destId="{1D71B1E5-6B39-4842-94CA-612907EC3818}" srcOrd="1" destOrd="0" presId="urn:microsoft.com/office/officeart/2008/layout/NameandTitleOrganizationalChart"/>
+    <dgm:cxn modelId="{3D3C94A3-7D6E-4328-A6F0-A2BFDB24A01D}" type="presOf" srcId="{9B5504EE-262E-421F-B6D0-17AEEAEBC46F}" destId="{92001C25-B329-4FD2-B382-8854FA5A0124}" srcOrd="0" destOrd="0" presId="urn:microsoft.com/office/officeart/2008/layout/NameandTitleOrganizationalChart"/>
+    <dgm:cxn modelId="{3E59412A-37C6-4D5A-96A1-817CA50EDC45}" type="presOf" srcId="{2B66A6E6-4414-4871-A4F4-78792B81DA7C}" destId="{2A913493-92E6-4226-ABE4-D90F5277663B}" srcOrd="0" destOrd="0" presId="urn:microsoft.com/office/officeart/2008/layout/NameandTitleOrganizationalChart"/>
+    <dgm:cxn modelId="{78699BC9-229B-41BF-8370-7AC5B3F1CBA9}" srcId="{26E62099-3BC6-4E17-94C4-80340E00CF78}" destId="{2D592857-C4FF-4259-AB7B-8B5F06639A90}" srcOrd="3" destOrd="0" parTransId="{671859CD-AA71-42FD-8258-61968ACB1064}" sibTransId="{AB091C5F-1C2B-4511-A681-D7B94BC00380}"/>
     <dgm:cxn modelId="{65BC83F7-A1B6-48DA-AC62-1AECC01B8F99}" type="presOf" srcId="{04E9ED99-3317-4ECF-B07D-F4E9BFEAC8A0}" destId="{6ADAEA67-E1B0-45D1-A89A-AC72103A2032}" srcOrd="1" destOrd="0" presId="urn:microsoft.com/office/officeart/2008/layout/NameandTitleOrganizationalChart"/>
-    <dgm:cxn modelId="{E8FE7C8C-79ED-4A3F-802B-2D22D71D0CE6}" srcId="{9B5504EE-262E-421F-B6D0-17AEEAEBC46F}" destId="{26E62099-3BC6-4E17-94C4-80340E00CF78}" srcOrd="0" destOrd="0" parTransId="{E7A8FCB0-04D3-41C6-A08E-323E962A68EC}" sibTransId="{A2CC19FE-4BF6-4187-89D1-510EF69AD1BC}"/>
-    <dgm:cxn modelId="{3E59412A-37C6-4D5A-96A1-817CA50EDC45}" type="presOf" srcId="{2B66A6E6-4414-4871-A4F4-78792B81DA7C}" destId="{2A913493-92E6-4226-ABE4-D90F5277663B}" srcOrd="0" destOrd="0" presId="urn:microsoft.com/office/officeart/2008/layout/NameandTitleOrganizationalChart"/>
-    <dgm:cxn modelId="{47ADFDB1-FB21-4EDE-827A-31572B4DB065}" type="presOf" srcId="{1BA13A82-364A-46CA-BDAF-792FE3D2913E}" destId="{0133BCC6-49F8-4231-BAB2-704AE1F1BE24}" srcOrd="0" destOrd="0" presId="urn:microsoft.com/office/officeart/2008/layout/NameandTitleOrganizationalChart"/>
-    <dgm:cxn modelId="{4F8DF260-2437-4352-90CA-080BD6C25F3B}" type="presOf" srcId="{6F3ABB5B-4390-4D4C-A351-C086BA6E696F}" destId="{07B41DA2-F050-42A9-BE37-EBD07D6F544E}" srcOrd="0" destOrd="0" presId="urn:microsoft.com/office/officeart/2008/layout/NameandTitleOrganizationalChart"/>
-    <dgm:cxn modelId="{9A614BF6-9632-4039-9F89-577185A54E8C}" type="presOf" srcId="{9AC7ACC0-2733-4A78-B5DD-2F568ABCC62C}" destId="{8CCE3855-BA01-4ECE-80AC-CE4B31DD7EA3}" srcOrd="0" destOrd="0" presId="urn:microsoft.com/office/officeart/2008/layout/NameandTitleOrganizationalChart"/>
-    <dgm:cxn modelId="{FFAE1BB5-1BF0-402C-95E4-8A4CBAECB1A6}" type="presOf" srcId="{5A315CA4-91DF-4090-B63C-B2A9BD1CE594}" destId="{B2CC1828-1D29-48FA-A0DC-F04CA0CD2D21}" srcOrd="0" destOrd="0" presId="urn:microsoft.com/office/officeart/2008/layout/NameandTitleOrganizationalChart"/>
-    <dgm:cxn modelId="{A55DAE1E-7E21-4068-B3EE-5F4449C89E3A}" type="presOf" srcId="{2D592857-C4FF-4259-AB7B-8B5F06639A90}" destId="{E8B83CC0-9D3E-44F2-A4A5-337005BA78F2}" srcOrd="1" destOrd="0" presId="urn:microsoft.com/office/officeart/2008/layout/NameandTitleOrganizationalChart"/>
-    <dgm:cxn modelId="{1395BB25-83DC-4725-BF82-B651497F5871}" srcId="{FF31ECF4-BE1B-44EC-8950-5F3CAA13C9E1}" destId="{6F3ABB5B-4390-4D4C-A351-C086BA6E696F}" srcOrd="0" destOrd="0" parTransId="{5D122C4F-1DBD-4CF7-AC9C-40B0E92DBFB9}" sibTransId="{D00CBC1A-4C8F-442F-85CC-7F86597AB3FD}"/>
-    <dgm:cxn modelId="{F3BD405A-563A-4F43-BF87-634E760B4329}" type="presOf" srcId="{E21412F6-F8B6-4877-B5A3-1D2645173BD3}" destId="{55A454FB-B4B0-428E-976C-67FBFF903016}" srcOrd="0" destOrd="0" presId="urn:microsoft.com/office/officeart/2008/layout/NameandTitleOrganizationalChart"/>
-    <dgm:cxn modelId="{CA1E94D0-87CB-4923-8A1A-042EAC7E4FE4}" type="presOf" srcId="{671859CD-AA71-42FD-8258-61968ACB1064}" destId="{D80B2E31-E433-4D95-9026-4A5890030DC1}" srcOrd="0" destOrd="0" presId="urn:microsoft.com/office/officeart/2008/layout/NameandTitleOrganizationalChart"/>
-    <dgm:cxn modelId="{3D3C94A3-7D6E-4328-A6F0-A2BFDB24A01D}" type="presOf" srcId="{9B5504EE-262E-421F-B6D0-17AEEAEBC46F}" destId="{92001C25-B329-4FD2-B382-8854FA5A0124}" srcOrd="0" destOrd="0" presId="urn:microsoft.com/office/officeart/2008/layout/NameandTitleOrganizationalChart"/>
-    <dgm:cxn modelId="{E4E45663-9788-43E5-BC6E-E0773C6455FD}" srcId="{26E62099-3BC6-4E17-94C4-80340E00CF78}" destId="{A70E35BE-CEE2-47FF-9BB0-05D25DCD34F7}" srcOrd="5" destOrd="0" parTransId="{2B66A6E6-4414-4871-A4F4-78792B81DA7C}" sibTransId="{0A0BA593-C895-453D-A9EA-AA1A6EF12F21}"/>
-    <dgm:cxn modelId="{1929A109-36A0-4ED7-AF6E-66A8CBAB8D6F}" type="presOf" srcId="{4410F5B9-7A6E-4352-ABF4-75B25389A9D8}" destId="{852CC1FF-77EF-4779-8EFB-E14E8E9A70F0}" srcOrd="0" destOrd="0" presId="urn:microsoft.com/office/officeart/2008/layout/NameandTitleOrganizationalChart"/>
-    <dgm:cxn modelId="{6DE6D761-5EEE-4A09-A159-D4DF8131D69D}" srcId="{E15456C9-1264-44CE-A46A-1332FDEA4D63}" destId="{FF31ECF4-BE1B-44EC-8950-5F3CAA13C9E1}" srcOrd="1" destOrd="0" parTransId="{C52EAC42-BF7A-4839-BED5-3E5C5A8A8F1B}" sibTransId="{A3C83099-6BFA-44E1-B0A9-C07070F4815D}"/>
-    <dgm:cxn modelId="{9366031C-995F-44DC-BBF1-4AE44545418F}" type="presOf" srcId="{E21412F6-F8B6-4877-B5A3-1D2645173BD3}" destId="{25BCDCA1-7378-4966-BF53-CF07D25A4218}" srcOrd="1" destOrd="0" presId="urn:microsoft.com/office/officeart/2008/layout/NameandTitleOrganizationalChart"/>
-    <dgm:cxn modelId="{707D05A3-E703-4684-9DF9-F903169F64F5}" srcId="{26E62099-3BC6-4E17-94C4-80340E00CF78}" destId="{04E9ED99-3317-4ECF-B07D-F4E9BFEAC8A0}" srcOrd="2" destOrd="0" parTransId="{22474AD4-F4CF-4F5E-9EEF-94B485CCCEEE}" sibTransId="{5C8C7E6B-D7EF-4A3D-AB3B-336AE497B83E}"/>
-    <dgm:cxn modelId="{DC789776-2708-48A0-A156-249D6BCC4A00}" type="presOf" srcId="{0A0BA593-C895-453D-A9EA-AA1A6EF12F21}" destId="{8E6E4251-BCF8-4FB1-A02B-56F8FA370E84}" srcOrd="0" destOrd="0" presId="urn:microsoft.com/office/officeart/2008/layout/NameandTitleOrganizationalChart"/>
-    <dgm:cxn modelId="{7A8BAA46-4AC7-4D99-A870-B576128DA040}" srcId="{E21412F6-F8B6-4877-B5A3-1D2645173BD3}" destId="{F8540D8F-842D-4728-AB5D-7C88723AA44D}" srcOrd="0" destOrd="0" parTransId="{9AC7ACC0-2733-4A78-B5DD-2F568ABCC62C}" sibTransId="{86D205F2-DF1C-4523-A1B4-E357476C5541}"/>
-    <dgm:cxn modelId="{90457F4E-5C90-405E-8D3B-3608B68FDC52}" type="presOf" srcId="{2DB39D95-EFF2-420B-AFBF-73D10E1400C0}" destId="{95E6DB3B-AD48-4715-9855-4898B682D86D}" srcOrd="0" destOrd="0" presId="urn:microsoft.com/office/officeart/2008/layout/NameandTitleOrganizationalChart"/>
-    <dgm:cxn modelId="{5231FEDA-BC49-4C3B-8963-43281F30983F}" type="presOf" srcId="{C52EAC42-BF7A-4839-BED5-3E5C5A8A8F1B}" destId="{2F150A28-35D7-4EDD-AD14-08E30D1702BB}" srcOrd="0" destOrd="0" presId="urn:microsoft.com/office/officeart/2008/layout/NameandTitleOrganizationalChart"/>
-    <dgm:cxn modelId="{3ED77A3D-3F99-43A8-91ED-07EAC87BD0E8}" type="presOf" srcId="{B91C093C-03B1-401C-8462-11DC6CC3E891}" destId="{1C89C8D1-8B8E-4239-BCFF-04AA4DF5D267}" srcOrd="0" destOrd="0" presId="urn:microsoft.com/office/officeart/2008/layout/NameandTitleOrganizationalChart"/>
-    <dgm:cxn modelId="{9A1D5EE3-B47C-4C0B-A30B-F05640F3C9EA}" type="presOf" srcId="{5A315CA4-91DF-4090-B63C-B2A9BD1CE594}" destId="{9A9C2577-DD1A-4A82-A7B5-333FAE126AAA}" srcOrd="1" destOrd="0" presId="urn:microsoft.com/office/officeart/2008/layout/NameandTitleOrganizationalChart"/>
-    <dgm:cxn modelId="{49DA2137-32CE-45B2-8788-C2FE104ED86F}" type="presOf" srcId="{883F479D-59C7-4D7B-A722-21C7D5F2E269}" destId="{5484D4D6-EA5E-47A9-8B98-31668B75EC0C}" srcOrd="1" destOrd="0" presId="urn:microsoft.com/office/officeart/2008/layout/NameandTitleOrganizationalChart"/>
+    <dgm:cxn modelId="{53290116-440C-460C-8882-5BF886A04AF3}" type="presOf" srcId="{90F310DB-8B4B-4A3C-BC11-30000B3AF5E0}" destId="{B7BE6F71-DCEE-4A74-B377-2CA0B5CEBA74}" srcOrd="0" destOrd="0" presId="urn:microsoft.com/office/officeart/2008/layout/NameandTitleOrganizationalChart"/>
+    <dgm:cxn modelId="{D45B13F4-EE30-4A90-A695-882535BB06BD}" type="presOf" srcId="{E15456C9-1264-44CE-A46A-1332FDEA4D63}" destId="{AAFD393B-D5C6-4FC1-85BB-67D689A5CB66}" srcOrd="0" destOrd="0" presId="urn:microsoft.com/office/officeart/2008/layout/NameandTitleOrganizationalChart"/>
+    <dgm:cxn modelId="{BAE672C5-5CB7-4479-BB59-CCD465556D62}" srcId="{26E62099-3BC6-4E17-94C4-80340E00CF78}" destId="{883F479D-59C7-4D7B-A722-21C7D5F2E269}" srcOrd="0" destOrd="0" parTransId="{90F310DB-8B4B-4A3C-BC11-30000B3AF5E0}" sibTransId="{E5511235-BB9F-44F7-929B-94718C9EFAFA}"/>
     <dgm:cxn modelId="{B815DE26-22B0-4FF1-BE7B-C4459D484FF6}" srcId="{E21412F6-F8B6-4877-B5A3-1D2645173BD3}" destId="{98B8A5A8-2B75-48BA-8041-9C13C210609D}" srcOrd="1" destOrd="0" parTransId="{340911AF-DD18-4E72-8A97-F432B6E4DC21}" sibTransId="{559F360A-D66E-4968-B66A-04F022DA2384}"/>
-    <dgm:cxn modelId="{2C07ABD4-9DC0-44C9-AB30-147C012BEC8F}" type="presOf" srcId="{39E5A908-DBFD-4C86-BA62-23E66E1A68F3}" destId="{2949CF0C-287F-4175-BF06-92EAB5C96BB2}" srcOrd="0" destOrd="0" presId="urn:microsoft.com/office/officeart/2008/layout/NameandTitleOrganizationalChart"/>
-    <dgm:cxn modelId="{D88B736C-D59B-46BA-BD02-312C7950D290}" type="presOf" srcId="{26E62099-3BC6-4E17-94C4-80340E00CF78}" destId="{99D4E039-A8D0-4953-9B21-FAC1C94D5CE2}" srcOrd="1" destOrd="0" presId="urn:microsoft.com/office/officeart/2008/layout/NameandTitleOrganizationalChart"/>
-    <dgm:cxn modelId="{459A5F50-E40A-4351-ADE9-824A6DF7A4EC}" type="presOf" srcId="{09A1C1D9-D891-4DBA-8289-95E3ED6379E3}" destId="{B26AA340-B012-450C-B965-9765131C5F60}" srcOrd="0" destOrd="0" presId="urn:microsoft.com/office/officeart/2008/layout/NameandTitleOrganizationalChart"/>
-    <dgm:cxn modelId="{4914C4E4-AAF2-4221-A5B5-C80E45C47DC8}" type="presOf" srcId="{ADE585E9-6E3D-4B4C-859F-3240CF01A0CE}" destId="{0143DD8F-A4C4-4301-8C10-45F38F05B4AE}" srcOrd="0" destOrd="0" presId="urn:microsoft.com/office/officeart/2008/layout/NameandTitleOrganizationalChart"/>
-    <dgm:cxn modelId="{B6C74065-225D-41AC-BA1E-6F23FD857995}" type="presOf" srcId="{B6D8A5CD-05D7-4BD6-930B-661C00AFF661}" destId="{02C004B2-63B3-4608-9345-22E9CC3E868C}" srcOrd="1" destOrd="0" presId="urn:microsoft.com/office/officeart/2008/layout/NameandTitleOrganizationalChart"/>
-    <dgm:cxn modelId="{6EE96CD4-457E-4A9B-8A7F-1CA50C09CAD7}" type="presOf" srcId="{C99AAC59-7635-4022-BF61-F1B616ECF97A}" destId="{78214B65-B5FE-4ABF-8A0C-CA99AA9FB35E}" srcOrd="0" destOrd="0" presId="urn:microsoft.com/office/officeart/2008/layout/NameandTitleOrganizationalChart"/>
-    <dgm:cxn modelId="{53290116-440C-460C-8882-5BF886A04AF3}" type="presOf" srcId="{90F310DB-8B4B-4A3C-BC11-30000B3AF5E0}" destId="{B7BE6F71-DCEE-4A74-B377-2CA0B5CEBA74}" srcOrd="0" destOrd="0" presId="urn:microsoft.com/office/officeart/2008/layout/NameandTitleOrganizationalChart"/>
-    <dgm:cxn modelId="{7D76912B-BC23-4BC8-A44A-325E20BA1BE4}" type="presOf" srcId="{958569A8-FBDF-40B8-8EC1-75E2493F7471}" destId="{A1DD215B-CBF1-4A51-8AC4-400394873ED5}" srcOrd="1" destOrd="0" presId="urn:microsoft.com/office/officeart/2008/layout/NameandTitleOrganizationalChart"/>
-    <dgm:cxn modelId="{C07726E5-5B03-4688-8568-4C5BE59A43A5}" srcId="{FF31ECF4-BE1B-44EC-8950-5F3CAA13C9E1}" destId="{9B5504EE-262E-421F-B6D0-17AEEAEBC46F}" srcOrd="1" destOrd="0" parTransId="{1D5B3EF4-BE0A-4BBA-AC69-B7F49B651F6F}" sibTransId="{1A23467C-A501-4E71-A007-E39C51AAC1F6}"/>
-    <dgm:cxn modelId="{AD4AA747-F3A8-41E2-8B62-868A5B791275}" type="presOf" srcId="{5C8C7E6B-D7EF-4A3D-AB3B-336AE497B83E}" destId="{F380191F-68F7-4007-A4C0-DAB6CB8C3176}" srcOrd="0" destOrd="0" presId="urn:microsoft.com/office/officeart/2008/layout/NameandTitleOrganizationalChart"/>
-    <dgm:cxn modelId="{2EFF13AC-45AE-4F59-826B-7B02BC00AAEE}" type="presOf" srcId="{73234726-D4B4-4E51-AF5B-87A161E7FD1B}" destId="{4443E3C1-7F39-4CEC-910A-DF31A2168070}" srcOrd="0" destOrd="0" presId="urn:microsoft.com/office/officeart/2008/layout/NameandTitleOrganizationalChart"/>
-    <dgm:cxn modelId="{799ED841-8428-4588-B164-332BCAA758AB}" type="presOf" srcId="{B6D8A5CD-05D7-4BD6-930B-661C00AFF661}" destId="{A94D0759-1843-47BA-952A-DB309C1547CB}" srcOrd="0" destOrd="0" presId="urn:microsoft.com/office/officeart/2008/layout/NameandTitleOrganizationalChart"/>
-    <dgm:cxn modelId="{B66F2A30-A1ED-48E4-B117-351831710BE1}" type="presOf" srcId="{2E53A8AA-B911-4693-BB93-6A397BC88DBB}" destId="{8BD8E232-E0DA-4845-818E-EA2EBBC9B0BB}" srcOrd="0" destOrd="0" presId="urn:microsoft.com/office/officeart/2008/layout/NameandTitleOrganizationalChart"/>
-    <dgm:cxn modelId="{8B02A030-DD4A-4825-BBA1-01431D83BE9D}" srcId="{26E62099-3BC6-4E17-94C4-80340E00CF78}" destId="{1DB3B635-F31A-4C4C-8115-88FD0D07A89B}" srcOrd="7" destOrd="0" parTransId="{73234726-D4B4-4E51-AF5B-87A161E7FD1B}" sibTransId="{EDFC95DE-09A1-4484-B91F-4D53C6FCF9B2}"/>
-    <dgm:cxn modelId="{EB7CAFE1-D98F-4216-9E9F-70CE96A3AFCD}" type="presOf" srcId="{1DB3B635-F31A-4C4C-8115-88FD0D07A89B}" destId="{678B0968-8AF6-409D-A455-6407459F1796}" srcOrd="0" destOrd="0" presId="urn:microsoft.com/office/officeart/2008/layout/NameandTitleOrganizationalChart"/>
-    <dgm:cxn modelId="{D258D4DD-ECCB-48FE-9D54-1783765B822A}" type="presOf" srcId="{2D592857-C4FF-4259-AB7B-8B5F06639A90}" destId="{DC2A6A67-D1A7-48DB-9C30-2EE5AE05E793}" srcOrd="0" destOrd="0" presId="urn:microsoft.com/office/officeart/2008/layout/NameandTitleOrganizationalChart"/>
-    <dgm:cxn modelId="{78699BC9-229B-41BF-8370-7AC5B3F1CBA9}" srcId="{26E62099-3BC6-4E17-94C4-80340E00CF78}" destId="{2D592857-C4FF-4259-AB7B-8B5F06639A90}" srcOrd="3" destOrd="0" parTransId="{671859CD-AA71-42FD-8258-61968ACB1064}" sibTransId="{AB091C5F-1C2B-4511-A681-D7B94BC00380}"/>
-    <dgm:cxn modelId="{C40498F5-47B4-42BE-A6F6-FEB674B8B732}" srcId="{54B22CF6-907D-4AD8-92C4-0399267F5D7A}" destId="{E21412F6-F8B6-4877-B5A3-1D2645173BD3}" srcOrd="0" destOrd="0" parTransId="{6030B236-9283-4C83-A9F7-F5EC8843EAB8}" sibTransId="{80C7A12E-0A37-413C-9B41-A1F036E0B74B}"/>
-    <dgm:cxn modelId="{C8D3A0C7-6FA8-484F-A5DD-962F674AD387}" srcId="{98B8A5A8-2B75-48BA-8041-9C13C210609D}" destId="{E15456C9-1264-44CE-A46A-1332FDEA4D63}" srcOrd="1" destOrd="0" parTransId="{39E5A908-DBFD-4C86-BA62-23E66E1A68F3}" sibTransId="{2DB39D95-EFF2-420B-AFBF-73D10E1400C0}"/>
-    <dgm:cxn modelId="{8E442753-5FE7-40C7-9F69-6012550D209B}" type="presOf" srcId="{E5C82CA0-96D5-4FFF-97E4-CCB952C228C7}" destId="{D6CBF49A-2774-4508-A938-94A33E3AE15D}" srcOrd="1" destOrd="0" presId="urn:microsoft.com/office/officeart/2008/layout/NameandTitleOrganizationalChart"/>
-    <dgm:cxn modelId="{7C24D88A-BD01-4EE3-8E41-5C7A1E908B39}" type="presOf" srcId="{E6172D37-089F-4CBC-86F1-74615E51D65C}" destId="{E71EE907-1921-4348-A4A3-ACB8222C7F4E}" srcOrd="0" destOrd="0" presId="urn:microsoft.com/office/officeart/2008/layout/NameandTitleOrganizationalChart"/>
-    <dgm:cxn modelId="{3C545EF2-73C6-4008-A416-65C36013DC82}" type="presOf" srcId="{A3C83099-6BFA-44E1-B0A9-C07070F4815D}" destId="{687579E5-F4F4-4EF1-A1AC-287D3B03AD65}" srcOrd="0" destOrd="0" presId="urn:microsoft.com/office/officeart/2008/layout/NameandTitleOrganizationalChart"/>
-    <dgm:cxn modelId="{AF361DD8-F289-4CF0-A832-21B3C4C099A3}" type="presOf" srcId="{54B22CF6-907D-4AD8-92C4-0399267F5D7A}" destId="{57E8A9A6-D72E-44F7-98C8-FCFACFF93606}" srcOrd="0" destOrd="0" presId="urn:microsoft.com/office/officeart/2008/layout/NameandTitleOrganizationalChart"/>
+    <dgm:cxn modelId="{DB4AF635-17EA-4D60-B6BA-EA341A022A10}" type="presOf" srcId="{FF31ECF4-BE1B-44EC-8950-5F3CAA13C9E1}" destId="{28AA62B0-0144-4478-95AE-6BB68EA28D13}" srcOrd="1" destOrd="0" presId="urn:microsoft.com/office/officeart/2008/layout/NameandTitleOrganizationalChart"/>
     <dgm:cxn modelId="{733B436D-1B5C-4ADA-A341-4419BA3758B0}" type="presParOf" srcId="{57E8A9A6-D72E-44F7-98C8-FCFACFF93606}" destId="{027AE4A1-F3D4-4CF8-A474-CD77141B48A7}" srcOrd="0" destOrd="0" presId="urn:microsoft.com/office/officeart/2008/layout/NameandTitleOrganizationalChart"/>
     <dgm:cxn modelId="{B86DE0F9-F747-45EA-8289-69B1E1BF1899}" type="presParOf" srcId="{027AE4A1-F3D4-4CF8-A474-CD77141B48A7}" destId="{9AD09C3B-933D-4228-AC1F-C0FD921B5806}" srcOrd="0" destOrd="0" presId="urn:microsoft.com/office/officeart/2008/layout/NameandTitleOrganizationalChart"/>
     <dgm:cxn modelId="{3B2B13D9-8D09-4F06-A7B4-04C000EE5558}" type="presParOf" srcId="{9AD09C3B-933D-4228-AC1F-C0FD921B5806}" destId="{55A454FB-B4B0-428E-976C-67FBFF903016}" srcOrd="0" destOrd="0" presId="urn:microsoft.com/office/officeart/2008/layout/NameandTitleOrganizationalChart"/>
@@ -12231,6 +12231,13 @@
         </dgm:presLayoutVars>
       </dgm:prSet>
       <dgm:spPr/>
+      <dgm:t>
+        <a:bodyPr/>
+        <a:lstStyle/>
+        <a:p>
+          <a:endParaRPr lang="zh-CN" altLang="en-US"/>
+        </a:p>
+      </dgm:t>
     </dgm:pt>
     <dgm:pt modelId="{24FCE1F8-C0FE-4FCF-ADDF-E83A8460CED9}" type="pres">
       <dgm:prSet presAssocID="{55D80AD9-7D5E-458D-9C91-EB4398DB7839}" presName="hierRoot1" presStyleCnt="0"/>
@@ -12266,6 +12273,13 @@
     <dgm:pt modelId="{DF50FACA-A9C7-4728-A10B-A4394D75DD0A}" type="pres">
       <dgm:prSet presAssocID="{62237801-2C8B-49D0-882B-97DF122FA234}" presName="Name10" presStyleLbl="parChTrans1D2" presStyleIdx="0" presStyleCnt="1"/>
       <dgm:spPr/>
+      <dgm:t>
+        <a:bodyPr/>
+        <a:lstStyle/>
+        <a:p>
+          <a:endParaRPr lang="zh-CN" altLang="en-US"/>
+        </a:p>
+      </dgm:t>
     </dgm:pt>
     <dgm:pt modelId="{1AE099FB-5993-47E6-AF79-9C0124117C52}" type="pres">
       <dgm:prSet presAssocID="{FC59B4B6-59C4-49ED-B309-8CA92837AA06}" presName="hierRoot2" presStyleCnt="0"/>
@@ -12301,6 +12315,13 @@
     <dgm:pt modelId="{BFE7BD29-6EBA-47E6-953F-D2B81FC2C55F}" type="pres">
       <dgm:prSet presAssocID="{E531BC39-6689-4234-BFBE-6F0A86B0DFED}" presName="Name17" presStyleLbl="parChTrans1D3" presStyleIdx="0" presStyleCnt="1"/>
       <dgm:spPr/>
+      <dgm:t>
+        <a:bodyPr/>
+        <a:lstStyle/>
+        <a:p>
+          <a:endParaRPr lang="zh-CN" altLang="en-US"/>
+        </a:p>
+      </dgm:t>
     </dgm:pt>
     <dgm:pt modelId="{556B1B3C-4B2C-428E-A90F-B6DC1369F310}" type="pres">
       <dgm:prSet presAssocID="{A77ECA37-D312-4985-87C0-F6AE652AF781}" presName="hierRoot3" presStyleCnt="0"/>
@@ -12336,6 +12357,13 @@
     <dgm:pt modelId="{28C636A2-0E9C-440A-A1C4-3CA92E59E620}" type="pres">
       <dgm:prSet presAssocID="{C7C1512D-484C-4C6C-83D5-93D9A29CF8BA}" presName="Name23" presStyleLbl="parChTrans1D4" presStyleIdx="0" presStyleCnt="1"/>
       <dgm:spPr/>
+      <dgm:t>
+        <a:bodyPr/>
+        <a:lstStyle/>
+        <a:p>
+          <a:endParaRPr lang="zh-CN" altLang="en-US"/>
+        </a:p>
+      </dgm:t>
     </dgm:pt>
     <dgm:pt modelId="{742EAE3A-B8F4-41F7-8E16-F6239D2EB0A9}" type="pres">
       <dgm:prSet presAssocID="{60BF9A2B-8B0D-42C8-A7FA-4B96564583D6}" presName="hierRoot4" presStyleCnt="0"/>
@@ -12370,18 +12398,18 @@
     </dgm:pt>
   </dgm:ptLst>
   <dgm:cxnLst>
+    <dgm:cxn modelId="{EDECD3D8-915F-4E13-9161-2862A62CE912}" type="presOf" srcId="{E531BC39-6689-4234-BFBE-6F0A86B0DFED}" destId="{BFE7BD29-6EBA-47E6-953F-D2B81FC2C55F}" srcOrd="0" destOrd="0" presId="urn:microsoft.com/office/officeart/2005/8/layout/hierarchy1"/>
+    <dgm:cxn modelId="{4D4BF2A0-BE9D-4949-AB55-73DA9031F938}" type="presOf" srcId="{62237801-2C8B-49D0-882B-97DF122FA234}" destId="{DF50FACA-A9C7-4728-A10B-A4394D75DD0A}" srcOrd="0" destOrd="0" presId="urn:microsoft.com/office/officeart/2005/8/layout/hierarchy1"/>
     <dgm:cxn modelId="{9478C26F-4C29-4D8D-8673-19E9C11D4AE2}" type="presOf" srcId="{C7C1512D-484C-4C6C-83D5-93D9A29CF8BA}" destId="{28C636A2-0E9C-440A-A1C4-3CA92E59E620}" srcOrd="0" destOrd="0" presId="urn:microsoft.com/office/officeart/2005/8/layout/hierarchy1"/>
-    <dgm:cxn modelId="{D15ED79A-7B5A-4365-B3B6-7157E71B173E}" type="presOf" srcId="{FC59B4B6-59C4-49ED-B309-8CA92837AA06}" destId="{CDA46515-5BA9-4ABF-9303-993AF9356BC8}" srcOrd="0" destOrd="0" presId="urn:microsoft.com/office/officeart/2005/8/layout/hierarchy1"/>
-    <dgm:cxn modelId="{67F2B097-2B62-4EC0-9FFA-E775947C379F}" type="presOf" srcId="{55D80AD9-7D5E-458D-9C91-EB4398DB7839}" destId="{AFCF927C-06B2-4ED6-BD29-54CC7DD269BF}" srcOrd="0" destOrd="0" presId="urn:microsoft.com/office/officeart/2005/8/layout/hierarchy1"/>
-    <dgm:cxn modelId="{216E71DD-B795-40C1-8C70-38A5BF689DBE}" type="presOf" srcId="{60BF9A2B-8B0D-42C8-A7FA-4B96564583D6}" destId="{5DD02524-447C-43F5-A961-F9E73C3FD357}" srcOrd="0" destOrd="0" presId="urn:microsoft.com/office/officeart/2005/8/layout/hierarchy1"/>
-    <dgm:cxn modelId="{9D9BED44-CC97-48BA-B8AC-EE25DE983F49}" type="presOf" srcId="{9E3D725A-8B26-4BDB-82B0-31E24F97AB5C}" destId="{1C9D6D1D-6BD6-4D5C-8F08-7578EEF03920}" srcOrd="0" destOrd="0" presId="urn:microsoft.com/office/officeart/2005/8/layout/hierarchy1"/>
-    <dgm:cxn modelId="{E8B87AE2-81AF-4F19-88AC-EE027118BAD4}" srcId="{FC59B4B6-59C4-49ED-B309-8CA92837AA06}" destId="{A77ECA37-D312-4985-87C0-F6AE652AF781}" srcOrd="0" destOrd="0" parTransId="{E531BC39-6689-4234-BFBE-6F0A86B0DFED}" sibTransId="{5E756152-71A6-48AC-BF30-F1591CB93E4D}"/>
-    <dgm:cxn modelId="{1722F2B8-4622-4693-888B-7BA4A814004B}" srcId="{55D80AD9-7D5E-458D-9C91-EB4398DB7839}" destId="{FC59B4B6-59C4-49ED-B309-8CA92837AA06}" srcOrd="0" destOrd="0" parTransId="{62237801-2C8B-49D0-882B-97DF122FA234}" sibTransId="{3A2D2D13-884B-4C38-BCCD-2B9F1B01940C}"/>
-    <dgm:cxn modelId="{EDECD3D8-915F-4E13-9161-2862A62CE912}" type="presOf" srcId="{E531BC39-6689-4234-BFBE-6F0A86B0DFED}" destId="{BFE7BD29-6EBA-47E6-953F-D2B81FC2C55F}" srcOrd="0" destOrd="0" presId="urn:microsoft.com/office/officeart/2005/8/layout/hierarchy1"/>
-    <dgm:cxn modelId="{9F801D81-ACDB-409E-9CC2-93BD3C69280A}" type="presOf" srcId="{A77ECA37-D312-4985-87C0-F6AE652AF781}" destId="{66A3C04D-0269-4B89-9E33-015703AC0159}" srcOrd="0" destOrd="0" presId="urn:microsoft.com/office/officeart/2005/8/layout/hierarchy1"/>
     <dgm:cxn modelId="{D597A139-5C97-49D9-8A30-29CE2C0E12DF}" srcId="{A77ECA37-D312-4985-87C0-F6AE652AF781}" destId="{60BF9A2B-8B0D-42C8-A7FA-4B96564583D6}" srcOrd="0" destOrd="0" parTransId="{C7C1512D-484C-4C6C-83D5-93D9A29CF8BA}" sibTransId="{6AFF551D-011F-4754-8F6A-9906486580DA}"/>
     <dgm:cxn modelId="{D996F966-83EB-4B37-AD8C-26F6A2350485}" srcId="{9E3D725A-8B26-4BDB-82B0-31E24F97AB5C}" destId="{55D80AD9-7D5E-458D-9C91-EB4398DB7839}" srcOrd="0" destOrd="0" parTransId="{0C5A47C7-AAA4-45C2-BBF0-30ACF2E34466}" sibTransId="{116E6A6B-C145-4FA3-AFEF-821736F9282E}"/>
-    <dgm:cxn modelId="{4D4BF2A0-BE9D-4949-AB55-73DA9031F938}" type="presOf" srcId="{62237801-2C8B-49D0-882B-97DF122FA234}" destId="{DF50FACA-A9C7-4728-A10B-A4394D75DD0A}" srcOrd="0" destOrd="0" presId="urn:microsoft.com/office/officeart/2005/8/layout/hierarchy1"/>
+    <dgm:cxn modelId="{D15ED79A-7B5A-4365-B3B6-7157E71B173E}" type="presOf" srcId="{FC59B4B6-59C4-49ED-B309-8CA92837AA06}" destId="{CDA46515-5BA9-4ABF-9303-993AF9356BC8}" srcOrd="0" destOrd="0" presId="urn:microsoft.com/office/officeart/2005/8/layout/hierarchy1"/>
+    <dgm:cxn modelId="{E8B87AE2-81AF-4F19-88AC-EE027118BAD4}" srcId="{FC59B4B6-59C4-49ED-B309-8CA92837AA06}" destId="{A77ECA37-D312-4985-87C0-F6AE652AF781}" srcOrd="0" destOrd="0" parTransId="{E531BC39-6689-4234-BFBE-6F0A86B0DFED}" sibTransId="{5E756152-71A6-48AC-BF30-F1591CB93E4D}"/>
+    <dgm:cxn modelId="{67F2B097-2B62-4EC0-9FFA-E775947C379F}" type="presOf" srcId="{55D80AD9-7D5E-458D-9C91-EB4398DB7839}" destId="{AFCF927C-06B2-4ED6-BD29-54CC7DD269BF}" srcOrd="0" destOrd="0" presId="urn:microsoft.com/office/officeart/2005/8/layout/hierarchy1"/>
+    <dgm:cxn modelId="{9D9BED44-CC97-48BA-B8AC-EE25DE983F49}" type="presOf" srcId="{9E3D725A-8B26-4BDB-82B0-31E24F97AB5C}" destId="{1C9D6D1D-6BD6-4D5C-8F08-7578EEF03920}" srcOrd="0" destOrd="0" presId="urn:microsoft.com/office/officeart/2005/8/layout/hierarchy1"/>
+    <dgm:cxn modelId="{1722F2B8-4622-4693-888B-7BA4A814004B}" srcId="{55D80AD9-7D5E-458D-9C91-EB4398DB7839}" destId="{FC59B4B6-59C4-49ED-B309-8CA92837AA06}" srcOrd="0" destOrd="0" parTransId="{62237801-2C8B-49D0-882B-97DF122FA234}" sibTransId="{3A2D2D13-884B-4C38-BCCD-2B9F1B01940C}"/>
+    <dgm:cxn modelId="{9F801D81-ACDB-409E-9CC2-93BD3C69280A}" type="presOf" srcId="{A77ECA37-D312-4985-87C0-F6AE652AF781}" destId="{66A3C04D-0269-4B89-9E33-015703AC0159}" srcOrd="0" destOrd="0" presId="urn:microsoft.com/office/officeart/2005/8/layout/hierarchy1"/>
+    <dgm:cxn modelId="{216E71DD-B795-40C1-8C70-38A5BF689DBE}" type="presOf" srcId="{60BF9A2B-8B0D-42C8-A7FA-4B96564583D6}" destId="{5DD02524-447C-43F5-A961-F9E73C3FD357}" srcOrd="0" destOrd="0" presId="urn:microsoft.com/office/officeart/2005/8/layout/hierarchy1"/>
     <dgm:cxn modelId="{CC65C5DA-C299-46CB-8E83-AC15B403EADE}" type="presParOf" srcId="{1C9D6D1D-6BD6-4D5C-8F08-7578EEF03920}" destId="{24FCE1F8-C0FE-4FCF-ADDF-E83A8460CED9}" srcOrd="0" destOrd="0" presId="urn:microsoft.com/office/officeart/2005/8/layout/hierarchy1"/>
     <dgm:cxn modelId="{76D094F9-B36F-4160-AE47-596E8E915734}" type="presParOf" srcId="{24FCE1F8-C0FE-4FCF-ADDF-E83A8460CED9}" destId="{63B4BCFF-14FE-47F3-AAB2-42C712460409}" srcOrd="0" destOrd="0" presId="urn:microsoft.com/office/officeart/2005/8/layout/hierarchy1"/>
     <dgm:cxn modelId="{0DBDAE76-A20A-4F92-BBFB-63DAD0694999}" type="presParOf" srcId="{63B4BCFF-14FE-47F3-AAB2-42C712460409}" destId="{F1072D58-374E-49C4-AC61-6D4EA4F1C96E}" srcOrd="0" destOrd="0" presId="urn:microsoft.com/office/officeart/2005/8/layout/hierarchy1"/>
@@ -12575,6 +12603,13 @@
         </dgm:presLayoutVars>
       </dgm:prSet>
       <dgm:spPr/>
+      <dgm:t>
+        <a:bodyPr/>
+        <a:lstStyle/>
+        <a:p>
+          <a:endParaRPr lang="zh-CN" altLang="en-US"/>
+        </a:p>
+      </dgm:t>
     </dgm:pt>
     <dgm:pt modelId="{BAEB0FB9-CDB6-4701-967B-35CF0EE032D2}" type="pres">
       <dgm:prSet presAssocID="{77CB9E26-CC4B-4E77-AB23-785873E4B2F8}" presName="hierRoot1" presStyleCnt="0"/>
@@ -12596,7 +12631,7 @@
       </dgm:t>
     </dgm:pt>
     <dgm:pt modelId="{AEECC729-55D0-4F88-B646-F800358DE5FD}" type="pres">
-      <dgm:prSet presAssocID="{77CB9E26-CC4B-4E77-AB23-785873E4B2F8}" presName="text" presStyleLbl="fgAcc0" presStyleIdx="0" presStyleCnt="1" custScaleX="21274" custScaleY="21578" custLinFactNeighborX="40989" custLinFactNeighborY="-12570">
+      <dgm:prSet presAssocID="{77CB9E26-CC4B-4E77-AB23-785873E4B2F8}" presName="text" presStyleLbl="fgAcc0" presStyleIdx="0" presStyleCnt="1" custScaleX="18373" custScaleY="38541" custLinFactNeighborX="40989" custLinFactNeighborY="-12570">
         <dgm:presLayoutVars>
           <dgm:chPref val="3"/>
         </dgm:presLayoutVars>
@@ -12617,6 +12652,13 @@
     <dgm:pt modelId="{CA326BA6-A316-4ECA-8B9C-C4CC74193539}" type="pres">
       <dgm:prSet presAssocID="{7304FEC9-4934-4677-B4C0-B7E5EDCE78BF}" presName="Name10" presStyleLbl="parChTrans1D2" presStyleIdx="0" presStyleCnt="1"/>
       <dgm:spPr/>
+      <dgm:t>
+        <a:bodyPr/>
+        <a:lstStyle/>
+        <a:p>
+          <a:endParaRPr lang="zh-CN" altLang="en-US"/>
+        </a:p>
+      </dgm:t>
     </dgm:pt>
     <dgm:pt modelId="{E16CAB73-9B49-4F97-935A-D4DA5A5FBE68}" type="pres">
       <dgm:prSet presAssocID="{112FD2E7-7E17-499B-B041-9C0E52B47AE0}" presName="hierRoot2" presStyleCnt="0"/>
@@ -12638,7 +12680,7 @@
       </dgm:t>
     </dgm:pt>
     <dgm:pt modelId="{1E0317A4-9C04-43B1-865A-B2CCCB3598BA}" type="pres">
-      <dgm:prSet presAssocID="{112FD2E7-7E17-499B-B041-9C0E52B47AE0}" presName="text2" presStyleLbl="fgAcc2" presStyleIdx="0" presStyleCnt="1" custScaleX="14306" custScaleY="11633" custLinFactNeighborX="34843" custLinFactNeighborY="-10771">
+      <dgm:prSet presAssocID="{112FD2E7-7E17-499B-B041-9C0E52B47AE0}" presName="text2" presStyleLbl="fgAcc2" presStyleIdx="0" presStyleCnt="1" custScaleX="14306" custScaleY="11633" custLinFactNeighborX="42290" custLinFactNeighborY="20564">
         <dgm:presLayoutVars>
           <dgm:chPref val="3"/>
         </dgm:presLayoutVars>
@@ -12658,12 +12700,12 @@
     </dgm:pt>
   </dgm:ptLst>
   <dgm:cxnLst>
+    <dgm:cxn modelId="{CAB2BBB3-F2B5-46A3-A481-3E05A1AFC80F}" type="presOf" srcId="{77CB9E26-CC4B-4E77-AB23-785873E4B2F8}" destId="{AEECC729-55D0-4F88-B646-F800358DE5FD}" srcOrd="0" destOrd="0" presId="urn:microsoft.com/office/officeart/2005/8/layout/hierarchy1"/>
+    <dgm:cxn modelId="{1B099DD6-0511-4ACD-AB28-67E9BEA6BD21}" srcId="{CCA03E88-35C6-48C5-B069-97C58ADF8328}" destId="{77CB9E26-CC4B-4E77-AB23-785873E4B2F8}" srcOrd="0" destOrd="0" parTransId="{6E4AC5FF-EC8E-4D80-8802-22899ADD7086}" sibTransId="{A8B92B7C-3229-4D68-A82E-129580B8FAFA}"/>
     <dgm:cxn modelId="{AD09CDB5-D802-4FB9-A531-91C886402CEE}" type="presOf" srcId="{7304FEC9-4934-4677-B4C0-B7E5EDCE78BF}" destId="{CA326BA6-A316-4ECA-8B9C-C4CC74193539}" srcOrd="0" destOrd="0" presId="urn:microsoft.com/office/officeart/2005/8/layout/hierarchy1"/>
     <dgm:cxn modelId="{5375A524-C899-486E-BB08-8807DF24AEE8}" type="presOf" srcId="{112FD2E7-7E17-499B-B041-9C0E52B47AE0}" destId="{1E0317A4-9C04-43B1-865A-B2CCCB3598BA}" srcOrd="0" destOrd="0" presId="urn:microsoft.com/office/officeart/2005/8/layout/hierarchy1"/>
-    <dgm:cxn modelId="{1B099DD6-0511-4ACD-AB28-67E9BEA6BD21}" srcId="{CCA03E88-35C6-48C5-B069-97C58ADF8328}" destId="{77CB9E26-CC4B-4E77-AB23-785873E4B2F8}" srcOrd="0" destOrd="0" parTransId="{6E4AC5FF-EC8E-4D80-8802-22899ADD7086}" sibTransId="{A8B92B7C-3229-4D68-A82E-129580B8FAFA}"/>
+    <dgm:cxn modelId="{56C20FD1-2E47-4D57-AF4B-3F3C989A97FD}" type="presOf" srcId="{CCA03E88-35C6-48C5-B069-97C58ADF8328}" destId="{F111061D-0F31-4B98-BA92-20E5ECF1A425}" srcOrd="0" destOrd="0" presId="urn:microsoft.com/office/officeart/2005/8/layout/hierarchy1"/>
     <dgm:cxn modelId="{8C4665FF-F9BA-4038-B965-AB9BE392D9D3}" srcId="{77CB9E26-CC4B-4E77-AB23-785873E4B2F8}" destId="{112FD2E7-7E17-499B-B041-9C0E52B47AE0}" srcOrd="0" destOrd="0" parTransId="{7304FEC9-4934-4677-B4C0-B7E5EDCE78BF}" sibTransId="{1E064ADD-8951-4A87-A972-326CC1C6FEA8}"/>
-    <dgm:cxn modelId="{CAB2BBB3-F2B5-46A3-A481-3E05A1AFC80F}" type="presOf" srcId="{77CB9E26-CC4B-4E77-AB23-785873E4B2F8}" destId="{AEECC729-55D0-4F88-B646-F800358DE5FD}" srcOrd="0" destOrd="0" presId="urn:microsoft.com/office/officeart/2005/8/layout/hierarchy1"/>
-    <dgm:cxn modelId="{56C20FD1-2E47-4D57-AF4B-3F3C989A97FD}" type="presOf" srcId="{CCA03E88-35C6-48C5-B069-97C58ADF8328}" destId="{F111061D-0F31-4B98-BA92-20E5ECF1A425}" srcOrd="0" destOrd="0" presId="urn:microsoft.com/office/officeart/2005/8/layout/hierarchy1"/>
     <dgm:cxn modelId="{561F292B-5FED-4822-B3AF-88F7D2AE97B7}" type="presParOf" srcId="{F111061D-0F31-4B98-BA92-20E5ECF1A425}" destId="{BAEB0FB9-CDB6-4701-967B-35CF0EE032D2}" srcOrd="0" destOrd="0" presId="urn:microsoft.com/office/officeart/2005/8/layout/hierarchy1"/>
     <dgm:cxn modelId="{E8B0583E-45D9-4488-B57B-0609D80B5A1F}" type="presParOf" srcId="{BAEB0FB9-CDB6-4701-967B-35CF0EE032D2}" destId="{B18AC258-DBB4-45D6-9790-9506A7D117BF}" srcOrd="0" destOrd="0" presId="urn:microsoft.com/office/officeart/2005/8/layout/hierarchy1"/>
     <dgm:cxn modelId="{909E83CA-ACEB-4D10-B0D6-FA48C57090E7}" type="presParOf" srcId="{B18AC258-DBB4-45D6-9790-9506A7D117BF}" destId="{E30260D4-B4CD-4B9A-A6E4-1DD180104EEF}" srcOrd="0" destOrd="0" presId="urn:microsoft.com/office/officeart/2005/8/layout/hierarchy1"/>
@@ -25568,8 +25610,8 @@
       </dsp:nvSpPr>
       <dsp:spPr>
         <a:xfrm>
-          <a:off x="6344669" y="939478"/>
-          <a:ext cx="338011" cy="2260316"/>
+          <a:off x="6791151" y="1342231"/>
+          <a:ext cx="110414" cy="2880759"/>
         </a:xfrm>
         <a:custGeom>
           <a:avLst/>
@@ -25580,16 +25622,16 @@
           <a:pathLst>
             <a:path>
               <a:moveTo>
-                <a:pt x="338011" y="0"/>
+                <a:pt x="0" y="0"/>
               </a:moveTo>
               <a:lnTo>
-                <a:pt x="338011" y="1567551"/>
+                <a:pt x="0" y="2187994"/>
               </a:lnTo>
               <a:lnTo>
-                <a:pt x="0" y="1567551"/>
+                <a:pt x="110414" y="2187994"/>
               </a:lnTo>
               <a:lnTo>
-                <a:pt x="0" y="2260316"/>
+                <a:pt x="110414" y="2880759"/>
               </a:lnTo>
             </a:path>
           </a:pathLst>
@@ -25630,8 +25672,8 @@
       </dsp:nvSpPr>
       <dsp:spPr>
         <a:xfrm>
-          <a:off x="5887232" y="-85177"/>
-          <a:ext cx="1590897" cy="1024655"/>
+          <a:off x="6104172" y="-487930"/>
+          <a:ext cx="1373956" cy="1830162"/>
         </a:xfrm>
         <a:prstGeom prst="roundRect">
           <a:avLst>
@@ -25682,8 +25724,8 @@
       </dsp:nvSpPr>
       <dsp:spPr>
         <a:xfrm>
-          <a:off x="6718135" y="704180"/>
-          <a:ext cx="1590897" cy="1024655"/>
+          <a:off x="6935076" y="301427"/>
+          <a:ext cx="1373956" cy="1830162"/>
         </a:xfrm>
         <a:prstGeom prst="roundRect">
           <a:avLst>
@@ -25726,12 +25768,12 @@
         <a:fontRef idx="minor"/>
       </dsp:style>
       <dsp:txBody>
-        <a:bodyPr spcFirstLastPara="0" vert="horz" wrap="square" lIns="26670" tIns="26670" rIns="26670" bIns="26670" numCol="1" spcCol="1270" anchor="ctr" anchorCtr="0">
+        <a:bodyPr spcFirstLastPara="0" vert="horz" wrap="square" lIns="22860" tIns="22860" rIns="22860" bIns="22860" numCol="1" spcCol="1270" anchor="ctr" anchorCtr="0">
           <a:noAutofit/>
         </a:bodyPr>
         <a:lstStyle/>
         <a:p>
-          <a:pPr lvl="0" algn="ctr" defTabSz="311150">
+          <a:pPr lvl="0" algn="ctr" defTabSz="266700">
             <a:lnSpc>
               <a:spcPct val="90000"/>
             </a:lnSpc>
@@ -25743,67 +25785,67 @@
             </a:spcAft>
           </a:pPr>
           <a:r>
-            <a:rPr lang="en-US" altLang="en-US" sz="700" kern="1200" dirty="0" err="1" smtClean="0"/>
+            <a:rPr lang="en-US" altLang="en-US" sz="600" kern="1200" dirty="0" err="1" smtClean="0"/>
             <a:t>CMap</a:t>
           </a:r>
           <a:r>
-            <a:rPr lang="en-US" altLang="en-US" sz="700" kern="1200" dirty="0" smtClean="0"/>
+            <a:rPr lang="en-US" altLang="en-US" sz="600" kern="1200" dirty="0" smtClean="0"/>
             <a:t>&lt;</a:t>
           </a:r>
           <a:r>
-            <a:rPr lang="en-US" altLang="en-US" sz="700" kern="1200" dirty="0" err="1" smtClean="0"/>
+            <a:rPr lang="en-US" altLang="en-US" sz="600" kern="1200" dirty="0" err="1" smtClean="0"/>
             <a:t>CCKey,const</a:t>
           </a:r>
           <a:r>
-            <a:rPr lang="en-US" altLang="en-US" sz="700" kern="1200" dirty="0" smtClean="0"/>
+            <a:rPr lang="en-US" altLang="en-US" sz="600" kern="1200" dirty="0" smtClean="0"/>
             <a:t> </a:t>
           </a:r>
           <a:r>
-            <a:rPr lang="en-US" altLang="en-US" sz="700" kern="1200" dirty="0" err="1" smtClean="0"/>
+            <a:rPr lang="en-US" altLang="en-US" sz="600" kern="1200" dirty="0" err="1" smtClean="0"/>
             <a:t>CCKey</a:t>
           </a:r>
           <a:r>
-            <a:rPr lang="en-US" altLang="en-US" sz="700" kern="1200" dirty="0" smtClean="0"/>
+            <a:rPr lang="en-US" altLang="en-US" sz="600" kern="1200" dirty="0" smtClean="0"/>
             <a:t>&amp;,</a:t>
           </a:r>
           <a:r>
-            <a:rPr lang="en-US" altLang="en-US" sz="700" kern="1200" dirty="0" err="1" smtClean="0"/>
+            <a:rPr lang="en-US" altLang="en-US" sz="600" kern="1200" dirty="0" err="1" smtClean="0"/>
             <a:t>CKnownFile</a:t>
           </a:r>
           <a:r>
-            <a:rPr lang="en-US" altLang="en-US" sz="700" kern="1200" dirty="0" smtClean="0"/>
+            <a:rPr lang="en-US" altLang="en-US" sz="600" kern="1200" dirty="0" smtClean="0"/>
             <a:t>*,</a:t>
           </a:r>
           <a:r>
-            <a:rPr lang="en-US" altLang="en-US" sz="700" kern="1200" dirty="0" err="1" smtClean="0"/>
+            <a:rPr lang="en-US" altLang="en-US" sz="600" kern="1200" dirty="0" err="1" smtClean="0"/>
             <a:t>CKnownFile</a:t>
           </a:r>
           <a:r>
-            <a:rPr lang="en-US" altLang="en-US" sz="700" kern="1200" dirty="0" smtClean="0"/>
+            <a:rPr lang="en-US" altLang="en-US" sz="600" kern="1200" dirty="0" smtClean="0"/>
             <a:t>*&gt; </a:t>
           </a:r>
           <a:r>
-            <a:rPr lang="en-US" altLang="en-US" sz="700" kern="1200" dirty="0" err="1" smtClean="0"/>
+            <a:rPr lang="en-US" altLang="en-US" sz="600" kern="1200" dirty="0" err="1" smtClean="0"/>
             <a:t>CSharedFileList</a:t>
           </a:r>
           <a:r>
-            <a:rPr lang="en-US" altLang="en-US" sz="700" kern="1200" dirty="0" smtClean="0"/>
+            <a:rPr lang="en-US" altLang="en-US" sz="600" kern="1200" dirty="0" smtClean="0"/>
             <a:t>::</a:t>
           </a:r>
           <a:r>
-            <a:rPr lang="en-US" altLang="en-US" sz="700" kern="1200" dirty="0" err="1" smtClean="0"/>
+            <a:rPr lang="en-US" altLang="en-US" sz="600" kern="1200" dirty="0" err="1" smtClean="0"/>
             <a:t>m_Files_map</a:t>
           </a:r>
           <a:r>
-            <a:rPr lang="en-US" altLang="en-US" sz="700" kern="1200" dirty="0" smtClean="0"/>
+            <a:rPr lang="en-US" altLang="en-US" sz="600" kern="1200" dirty="0" smtClean="0"/>
             <a:t>;</a:t>
           </a:r>
-          <a:endParaRPr lang="zh-CN" altLang="en-US" sz="700" kern="1200" dirty="0"/>
+          <a:endParaRPr lang="zh-CN" altLang="en-US" sz="600" kern="1200" dirty="0"/>
         </a:p>
       </dsp:txBody>
       <dsp:txXfrm>
-        <a:off x="6748146" y="734191"/>
-        <a:ext cx="1530875" cy="964633"/>
+        <a:off x="6975318" y="341669"/>
+        <a:ext cx="1293472" cy="1749678"/>
       </dsp:txXfrm>
     </dsp:sp>
     <dsp:sp modelId="{28E61F87-1B95-4776-96F4-F5E637B31ED1}">
@@ -25813,7 +25855,7 @@
       </dsp:nvSpPr>
       <dsp:spPr>
         <a:xfrm>
-          <a:off x="5809758" y="3199795"/>
+          <a:off x="6366655" y="4222991"/>
           <a:ext cx="1069821" cy="552406"/>
         </a:xfrm>
         <a:prstGeom prst="roundRect">
@@ -25865,7 +25907,7 @@
       </dsp:nvSpPr>
       <dsp:spPr>
         <a:xfrm>
-          <a:off x="6640662" y="3989153"/>
+          <a:off x="7197558" y="5012349"/>
           <a:ext cx="1069821" cy="552406"/>
         </a:xfrm>
         <a:prstGeom prst="roundRect">
@@ -25909,12 +25951,12 @@
         <a:fontRef idx="minor"/>
       </dsp:style>
       <dsp:txBody>
-        <a:bodyPr spcFirstLastPara="0" vert="horz" wrap="square" lIns="26670" tIns="26670" rIns="26670" bIns="26670" numCol="1" spcCol="1270" anchor="ctr" anchorCtr="0">
+        <a:bodyPr spcFirstLastPara="0" vert="horz" wrap="square" lIns="22860" tIns="22860" rIns="22860" bIns="22860" numCol="1" spcCol="1270" anchor="ctr" anchorCtr="0">
           <a:noAutofit/>
         </a:bodyPr>
         <a:lstStyle/>
         <a:p>
-          <a:pPr lvl="0" algn="ctr" defTabSz="311150">
+          <a:pPr lvl="0" algn="ctr" defTabSz="266700">
             <a:lnSpc>
               <a:spcPct val="90000"/>
             </a:lnSpc>
@@ -25926,22 +25968,22 @@
             </a:spcAft>
           </a:pPr>
           <a:r>
-            <a:rPr lang="en-US" altLang="zh-CN" sz="700" kern="1200" dirty="0" err="1" smtClean="0"/>
+            <a:rPr lang="en-US" altLang="zh-CN" sz="600" kern="1200" dirty="0" err="1" smtClean="0"/>
             <a:t>CKnownFile</a:t>
           </a:r>
           <a:r>
-            <a:rPr lang="zh-CN" altLang="en-US" sz="700" kern="1200" dirty="0" smtClean="0"/>
+            <a:rPr lang="zh-CN" altLang="en-US" sz="600" kern="1200" dirty="0" smtClean="0"/>
             <a:t>对象</a:t>
           </a:r>
           <a:r>
-            <a:rPr lang="en-US" altLang="zh-CN" sz="700" kern="1200" dirty="0" err="1" smtClean="0"/>
+            <a:rPr lang="en-US" altLang="zh-CN" sz="600" kern="1200" dirty="0" err="1" smtClean="0"/>
             <a:t>pFile</a:t>
           </a:r>
-          <a:endParaRPr lang="zh-CN" altLang="en-US" sz="700" kern="1200" dirty="0"/>
+          <a:endParaRPr lang="zh-CN" altLang="en-US" sz="600" kern="1200" dirty="0"/>
         </a:p>
       </dsp:txBody>
       <dsp:txXfrm>
-        <a:off x="6656841" y="4005332"/>
+        <a:off x="7213737" y="5028528"/>
         <a:ext cx="1037463" cy="520048"/>
       </dsp:txXfrm>
     </dsp:sp>
@@ -38134,7 +38176,7 @@
           <a:p>
             <a:fld id="{CC3DA29F-17ED-4219-9D87-E83D641A3947}" type="datetimeFigureOut">
               <a:rPr lang="zh-CN" altLang="en-US" smtClean="0"/>
-              <a:t>2017/4/18</a:t>
+              <a:t>2017/4/19</a:t>
             </a:fld>
             <a:endParaRPr lang="zh-CN" altLang="en-US"/>
           </a:p>
@@ -38304,7 +38346,7 @@
           <a:p>
             <a:fld id="{CC3DA29F-17ED-4219-9D87-E83D641A3947}" type="datetimeFigureOut">
               <a:rPr lang="zh-CN" altLang="en-US" smtClean="0"/>
-              <a:t>2017/4/18</a:t>
+              <a:t>2017/4/19</a:t>
             </a:fld>
             <a:endParaRPr lang="zh-CN" altLang="en-US"/>
           </a:p>
@@ -38484,7 +38526,7 @@
           <a:p>
             <a:fld id="{CC3DA29F-17ED-4219-9D87-E83D641A3947}" type="datetimeFigureOut">
               <a:rPr lang="zh-CN" altLang="en-US" smtClean="0"/>
-              <a:t>2017/4/18</a:t>
+              <a:t>2017/4/19</a:t>
             </a:fld>
             <a:endParaRPr lang="zh-CN" altLang="en-US"/>
           </a:p>
@@ -38654,7 +38696,7 @@
           <a:p>
             <a:fld id="{CC3DA29F-17ED-4219-9D87-E83D641A3947}" type="datetimeFigureOut">
               <a:rPr lang="zh-CN" altLang="en-US" smtClean="0"/>
-              <a:t>2017/4/18</a:t>
+              <a:t>2017/4/19</a:t>
             </a:fld>
             <a:endParaRPr lang="zh-CN" altLang="en-US"/>
           </a:p>
@@ -38900,7 +38942,7 @@
           <a:p>
             <a:fld id="{CC3DA29F-17ED-4219-9D87-E83D641A3947}" type="datetimeFigureOut">
               <a:rPr lang="zh-CN" altLang="en-US" smtClean="0"/>
-              <a:t>2017/4/18</a:t>
+              <a:t>2017/4/19</a:t>
             </a:fld>
             <a:endParaRPr lang="zh-CN" altLang="en-US"/>
           </a:p>
@@ -39132,7 +39174,7 @@
           <a:p>
             <a:fld id="{CC3DA29F-17ED-4219-9D87-E83D641A3947}" type="datetimeFigureOut">
               <a:rPr lang="zh-CN" altLang="en-US" smtClean="0"/>
-              <a:t>2017/4/18</a:t>
+              <a:t>2017/4/19</a:t>
             </a:fld>
             <a:endParaRPr lang="zh-CN" altLang="en-US"/>
           </a:p>
@@ -39499,7 +39541,7 @@
           <a:p>
             <a:fld id="{CC3DA29F-17ED-4219-9D87-E83D641A3947}" type="datetimeFigureOut">
               <a:rPr lang="zh-CN" altLang="en-US" smtClean="0"/>
-              <a:t>2017/4/18</a:t>
+              <a:t>2017/4/19</a:t>
             </a:fld>
             <a:endParaRPr lang="zh-CN" altLang="en-US"/>
           </a:p>
@@ -39617,7 +39659,7 @@
           <a:p>
             <a:fld id="{CC3DA29F-17ED-4219-9D87-E83D641A3947}" type="datetimeFigureOut">
               <a:rPr lang="zh-CN" altLang="en-US" smtClean="0"/>
-              <a:t>2017/4/18</a:t>
+              <a:t>2017/4/19</a:t>
             </a:fld>
             <a:endParaRPr lang="zh-CN" altLang="en-US"/>
           </a:p>
@@ -39712,7 +39754,7 @@
           <a:p>
             <a:fld id="{CC3DA29F-17ED-4219-9D87-E83D641A3947}" type="datetimeFigureOut">
               <a:rPr lang="zh-CN" altLang="en-US" smtClean="0"/>
-              <a:t>2017/4/18</a:t>
+              <a:t>2017/4/19</a:t>
             </a:fld>
             <a:endParaRPr lang="zh-CN" altLang="en-US"/>
           </a:p>
@@ -39989,7 +40031,7 @@
           <a:p>
             <a:fld id="{CC3DA29F-17ED-4219-9D87-E83D641A3947}" type="datetimeFigureOut">
               <a:rPr lang="zh-CN" altLang="en-US" smtClean="0"/>
-              <a:t>2017/4/18</a:t>
+              <a:t>2017/4/19</a:t>
             </a:fld>
             <a:endParaRPr lang="zh-CN" altLang="en-US"/>
           </a:p>
@@ -40242,7 +40284,7 @@
           <a:p>
             <a:fld id="{CC3DA29F-17ED-4219-9D87-E83D641A3947}" type="datetimeFigureOut">
               <a:rPr lang="zh-CN" altLang="en-US" smtClean="0"/>
-              <a:t>2017/4/18</a:t>
+              <a:t>2017/4/19</a:t>
             </a:fld>
             <a:endParaRPr lang="zh-CN" altLang="en-US"/>
           </a:p>
@@ -40455,7 +40497,7 @@
           <a:p>
             <a:fld id="{CC3DA29F-17ED-4219-9D87-E83D641A3947}" type="datetimeFigureOut">
               <a:rPr lang="zh-CN" altLang="en-US" smtClean="0"/>
-              <a:t>2017/4/18</a:t>
+              <a:t>2017/4/19</a:t>
             </a:fld>
             <a:endParaRPr lang="zh-CN" altLang="en-US"/>
           </a:p>
@@ -41097,7 +41139,7 @@
           <p:nvPr>
             <p:extLst>
               <p:ext uri="{D42A27DB-BD31-4B8C-83A1-F6EECF244321}">
-                <p14:modId xmlns:p14="http://schemas.microsoft.com/office/powerpoint/2010/main" val="63287865"/>
+                <p14:modId xmlns:p14="http://schemas.microsoft.com/office/powerpoint/2010/main" val="3541752176"/>
               </p:ext>
             </p:extLst>
           </p:nvPr>

</xml_diff>